<commit_message>
Update report presentation file
</commit_message>
<xml_diff>
--- a/report_presentation.pptx
+++ b/report_presentation.pptx
@@ -5,27 +5,30 @@
     <p:sldMasterId id="2147483648" r:id="rId4"/>
   </p:sldMasterIdLst>
   <p:notesMasterIdLst>
-    <p:notesMasterId r:id="rId20"/>
+    <p:notesMasterId r:id="rId23"/>
   </p:notesMasterIdLst>
   <p:handoutMasterIdLst>
-    <p:handoutMasterId r:id="rId21"/>
+    <p:handoutMasterId r:id="rId24"/>
   </p:handoutMasterIdLst>
   <p:sldIdLst>
     <p:sldId id="256" r:id="rId5"/>
-    <p:sldId id="257" r:id="rId6"/>
-    <p:sldId id="285" r:id="rId7"/>
-    <p:sldId id="260" r:id="rId8"/>
-    <p:sldId id="286" r:id="rId9"/>
-    <p:sldId id="258" r:id="rId10"/>
-    <p:sldId id="261" r:id="rId11"/>
-    <p:sldId id="287" r:id="rId12"/>
-    <p:sldId id="288" r:id="rId13"/>
-    <p:sldId id="262" r:id="rId14"/>
-    <p:sldId id="283" r:id="rId15"/>
-    <p:sldId id="264" r:id="rId16"/>
-    <p:sldId id="266" r:id="rId17"/>
-    <p:sldId id="284" r:id="rId18"/>
-    <p:sldId id="269" r:id="rId19"/>
+    <p:sldId id="258" r:id="rId6"/>
+    <p:sldId id="257" r:id="rId7"/>
+    <p:sldId id="261" r:id="rId8"/>
+    <p:sldId id="285" r:id="rId9"/>
+    <p:sldId id="260" r:id="rId10"/>
+    <p:sldId id="291" r:id="rId11"/>
+    <p:sldId id="289" r:id="rId12"/>
+    <p:sldId id="286" r:id="rId13"/>
+    <p:sldId id="290" r:id="rId14"/>
+    <p:sldId id="292" r:id="rId15"/>
+    <p:sldId id="287" r:id="rId16"/>
+    <p:sldId id="262" r:id="rId17"/>
+    <p:sldId id="283" r:id="rId18"/>
+    <p:sldId id="264" r:id="rId19"/>
+    <p:sldId id="266" r:id="rId20"/>
+    <p:sldId id="284" r:id="rId21"/>
+    <p:sldId id="269" r:id="rId22"/>
   </p:sldIdLst>
   <p:sldSz cx="12192000" cy="6858000"/>
   <p:notesSz cx="6858000" cy="9144000"/>
@@ -144,6 +147,267 @@
     </p:ext>
   </p:extLst>
 </p:presentation>
+</file>
+
+<file path=ppt/revisionInfo.xml><?xml version="1.0" encoding="utf-8"?>
+<p1510:revInfo xmlns:a="http://schemas.openxmlformats.org/drawingml/2006/main" xmlns:r="http://schemas.openxmlformats.org/officeDocument/2006/relationships" xmlns:p1510="http://schemas.microsoft.com/office/powerpoint/2015/10/main">
+  <p1510:revLst>
+    <p1510:client id="{C7A7ECF9-9CED-4093-8646-78E15AF0EC69}" v="7" dt="2023-01-16T18:03:33.450"/>
+  </p1510:revLst>
+</p1510:revInfo>
+</file>
+
+<file path=ppt/changesInfos/changesInfo1.xml><?xml version="1.0" encoding="utf-8"?>
+<pc:chgInfo xmlns:a="http://schemas.openxmlformats.org/drawingml/2006/main" xmlns:r="http://schemas.openxmlformats.org/officeDocument/2006/relationships" xmlns:ac="http://schemas.microsoft.com/office/drawing/2013/main/command" xmlns:pc="http://schemas.microsoft.com/office/powerpoint/2013/main/command">
+  <pc:docChgLst>
+    <pc:chgData name="Vasileios Ntaoulas" userId="019b8d86-4639-4c0e-a76e-43d098cf21e7" providerId="ADAL" clId="{C7A7ECF9-9CED-4093-8646-78E15AF0EC69}"/>
+    <pc:docChg chg="undo custSel addSld delSld modSld sldOrd">
+      <pc:chgData name="Vasileios Ntaoulas" userId="019b8d86-4639-4c0e-a76e-43d098cf21e7" providerId="ADAL" clId="{C7A7ECF9-9CED-4093-8646-78E15AF0EC69}" dt="2023-01-16T18:11:58.323" v="516" actId="478"/>
+      <pc:docMkLst>
+        <pc:docMk/>
+      </pc:docMkLst>
+      <pc:sldChg chg="modSp mod ord">
+        <pc:chgData name="Vasileios Ntaoulas" userId="019b8d86-4639-4c0e-a76e-43d098cf21e7" providerId="ADAL" clId="{C7A7ECF9-9CED-4093-8646-78E15AF0EC69}" dt="2023-01-16T17:43:35.448" v="76" actId="1076"/>
+        <pc:sldMkLst>
+          <pc:docMk/>
+          <pc:sldMk cId="3733486012" sldId="258"/>
+        </pc:sldMkLst>
+        <pc:spChg chg="mod">
+          <ac:chgData name="Vasileios Ntaoulas" userId="019b8d86-4639-4c0e-a76e-43d098cf21e7" providerId="ADAL" clId="{C7A7ECF9-9CED-4093-8646-78E15AF0EC69}" dt="2023-01-16T17:43:23.665" v="75" actId="403"/>
+          <ac:spMkLst>
+            <pc:docMk/>
+            <pc:sldMk cId="3733486012" sldId="258"/>
+            <ac:spMk id="7" creationId="{7875C19A-1AAE-476A-A316-A2CF92D763D3}"/>
+          </ac:spMkLst>
+        </pc:spChg>
+        <pc:spChg chg="mod">
+          <ac:chgData name="Vasileios Ntaoulas" userId="019b8d86-4639-4c0e-a76e-43d098cf21e7" providerId="ADAL" clId="{C7A7ECF9-9CED-4093-8646-78E15AF0EC69}" dt="2023-01-16T17:43:35.448" v="76" actId="1076"/>
+          <ac:spMkLst>
+            <pc:docMk/>
+            <pc:sldMk cId="3733486012" sldId="258"/>
+            <ac:spMk id="10" creationId="{EF2BC084-E6DB-4DE7-B309-042A85EBA700}"/>
+          </ac:spMkLst>
+        </pc:spChg>
+      </pc:sldChg>
+      <pc:sldChg chg="addSp delSp modSp mod ord">
+        <pc:chgData name="Vasileios Ntaoulas" userId="019b8d86-4639-4c0e-a76e-43d098cf21e7" providerId="ADAL" clId="{C7A7ECF9-9CED-4093-8646-78E15AF0EC69}" dt="2023-01-16T18:07:25.780" v="486" actId="1076"/>
+        <pc:sldMkLst>
+          <pc:docMk/>
+          <pc:sldMk cId="3607270498" sldId="261"/>
+        </pc:sldMkLst>
+        <pc:spChg chg="del">
+          <ac:chgData name="Vasileios Ntaoulas" userId="019b8d86-4639-4c0e-a76e-43d098cf21e7" providerId="ADAL" clId="{C7A7ECF9-9CED-4093-8646-78E15AF0EC69}" dt="2023-01-16T17:50:12.648" v="118" actId="478"/>
+          <ac:spMkLst>
+            <pc:docMk/>
+            <pc:sldMk cId="3607270498" sldId="261"/>
+            <ac:spMk id="5" creationId="{E0C87788-476B-4620-8002-A5C1177AD6C1}"/>
+          </ac:spMkLst>
+        </pc:spChg>
+        <pc:spChg chg="del">
+          <ac:chgData name="Vasileios Ntaoulas" userId="019b8d86-4639-4c0e-a76e-43d098cf21e7" providerId="ADAL" clId="{C7A7ECF9-9CED-4093-8646-78E15AF0EC69}" dt="2023-01-16T17:50:15.779" v="120" actId="478"/>
+          <ac:spMkLst>
+            <pc:docMk/>
+            <pc:sldMk cId="3607270498" sldId="261"/>
+            <ac:spMk id="6" creationId="{000A9570-5EF6-4AFB-9FCA-7C8998E3FEB1}"/>
+          </ac:spMkLst>
+        </pc:spChg>
+        <pc:spChg chg="mod">
+          <ac:chgData name="Vasileios Ntaoulas" userId="019b8d86-4639-4c0e-a76e-43d098cf21e7" providerId="ADAL" clId="{C7A7ECF9-9CED-4093-8646-78E15AF0EC69}" dt="2023-01-16T18:03:18.820" v="239" actId="20577"/>
+          <ac:spMkLst>
+            <pc:docMk/>
+            <pc:sldMk cId="3607270498" sldId="261"/>
+            <ac:spMk id="7" creationId="{B74126B4-1E6C-4FFF-9282-40E18A85A07F}"/>
+          </ac:spMkLst>
+        </pc:spChg>
+        <pc:spChg chg="mod">
+          <ac:chgData name="Vasileios Ntaoulas" userId="019b8d86-4639-4c0e-a76e-43d098cf21e7" providerId="ADAL" clId="{C7A7ECF9-9CED-4093-8646-78E15AF0EC69}" dt="2023-01-16T17:50:59.294" v="128" actId="1076"/>
+          <ac:spMkLst>
+            <pc:docMk/>
+            <pc:sldMk cId="3607270498" sldId="261"/>
+            <ac:spMk id="8" creationId="{47DC4E62-1A34-4F98-A451-214F1808519C}"/>
+          </ac:spMkLst>
+        </pc:spChg>
+        <pc:spChg chg="add del mod">
+          <ac:chgData name="Vasileios Ntaoulas" userId="019b8d86-4639-4c0e-a76e-43d098cf21e7" providerId="ADAL" clId="{C7A7ECF9-9CED-4093-8646-78E15AF0EC69}" dt="2023-01-16T17:50:14.064" v="119" actId="478"/>
+          <ac:spMkLst>
+            <pc:docMk/>
+            <pc:sldMk cId="3607270498" sldId="261"/>
+            <ac:spMk id="9" creationId="{B4887FCA-38FD-CC89-7E74-87258A493524}"/>
+          </ac:spMkLst>
+        </pc:spChg>
+        <pc:spChg chg="add del mod">
+          <ac:chgData name="Vasileios Ntaoulas" userId="019b8d86-4639-4c0e-a76e-43d098cf21e7" providerId="ADAL" clId="{C7A7ECF9-9CED-4093-8646-78E15AF0EC69}" dt="2023-01-16T17:50:16.608" v="121" actId="478"/>
+          <ac:spMkLst>
+            <pc:docMk/>
+            <pc:sldMk cId="3607270498" sldId="261"/>
+            <ac:spMk id="11" creationId="{7A06C2CF-FA1F-A745-23D5-932869DB56D5}"/>
+          </ac:spMkLst>
+        </pc:spChg>
+        <pc:spChg chg="add mod">
+          <ac:chgData name="Vasileios Ntaoulas" userId="019b8d86-4639-4c0e-a76e-43d098cf21e7" providerId="ADAL" clId="{C7A7ECF9-9CED-4093-8646-78E15AF0EC69}" dt="2023-01-16T18:07:25.780" v="486" actId="1076"/>
+          <ac:spMkLst>
+            <pc:docMk/>
+            <pc:sldMk cId="3607270498" sldId="261"/>
+            <ac:spMk id="16" creationId="{6E9C669F-25DE-441B-66D9-A361F6749E30}"/>
+          </ac:spMkLst>
+        </pc:spChg>
+        <pc:picChg chg="add del mod">
+          <ac:chgData name="Vasileios Ntaoulas" userId="019b8d86-4639-4c0e-a76e-43d098cf21e7" providerId="ADAL" clId="{C7A7ECF9-9CED-4093-8646-78E15AF0EC69}" dt="2023-01-16T17:51:21.355" v="134" actId="478"/>
+          <ac:picMkLst>
+            <pc:docMk/>
+            <pc:sldMk cId="3607270498" sldId="261"/>
+            <ac:picMk id="13" creationId="{3CCEB79B-2FF9-7615-E3DF-A151D39B300D}"/>
+          </ac:picMkLst>
+        </pc:picChg>
+        <pc:picChg chg="add mod">
+          <ac:chgData name="Vasileios Ntaoulas" userId="019b8d86-4639-4c0e-a76e-43d098cf21e7" providerId="ADAL" clId="{C7A7ECF9-9CED-4093-8646-78E15AF0EC69}" dt="2023-01-16T17:51:37.968" v="141" actId="14100"/>
+          <ac:picMkLst>
+            <pc:docMk/>
+            <pc:sldMk cId="3607270498" sldId="261"/>
+            <ac:picMk id="15" creationId="{D9589739-B711-59A2-F023-EFC9A664C867}"/>
+          </ac:picMkLst>
+        </pc:picChg>
+      </pc:sldChg>
+      <pc:sldChg chg="mod">
+        <pc:chgData name="Vasileios Ntaoulas" userId="019b8d86-4639-4c0e-a76e-43d098cf21e7" providerId="ADAL" clId="{C7A7ECF9-9CED-4093-8646-78E15AF0EC69}" dt="2023-01-16T17:46:05.702" v="93" actId="27918"/>
+        <pc:sldMkLst>
+          <pc:docMk/>
+          <pc:sldMk cId="3322300142" sldId="284"/>
+        </pc:sldMkLst>
+      </pc:sldChg>
+      <pc:sldChg chg="modSp mod">
+        <pc:chgData name="Vasileios Ntaoulas" userId="019b8d86-4639-4c0e-a76e-43d098cf21e7" providerId="ADAL" clId="{C7A7ECF9-9CED-4093-8646-78E15AF0EC69}" dt="2023-01-16T17:44:36.084" v="90" actId="20577"/>
+        <pc:sldMkLst>
+          <pc:docMk/>
+          <pc:sldMk cId="2229238531" sldId="287"/>
+        </pc:sldMkLst>
+        <pc:spChg chg="mod">
+          <ac:chgData name="Vasileios Ntaoulas" userId="019b8d86-4639-4c0e-a76e-43d098cf21e7" providerId="ADAL" clId="{C7A7ECF9-9CED-4093-8646-78E15AF0EC69}" dt="2023-01-16T17:44:36.084" v="90" actId="20577"/>
+          <ac:spMkLst>
+            <pc:docMk/>
+            <pc:sldMk cId="2229238531" sldId="287"/>
+            <ac:spMk id="4" creationId="{315E3981-F0D7-482C-A8E0-6A57700BECA7}"/>
+          </ac:spMkLst>
+        </pc:spChg>
+      </pc:sldChg>
+      <pc:sldChg chg="del">
+        <pc:chgData name="Vasileios Ntaoulas" userId="019b8d86-4639-4c0e-a76e-43d098cf21e7" providerId="ADAL" clId="{C7A7ECF9-9CED-4093-8646-78E15AF0EC69}" dt="2023-01-16T17:44:40.245" v="91" actId="47"/>
+        <pc:sldMkLst>
+          <pc:docMk/>
+          <pc:sldMk cId="2687334512" sldId="288"/>
+        </pc:sldMkLst>
+      </pc:sldChg>
+      <pc:sldChg chg="modSp add mod ord">
+        <pc:chgData name="Vasileios Ntaoulas" userId="019b8d86-4639-4c0e-a76e-43d098cf21e7" providerId="ADAL" clId="{C7A7ECF9-9CED-4093-8646-78E15AF0EC69}" dt="2023-01-16T17:43:48.912" v="77" actId="20577"/>
+        <pc:sldMkLst>
+          <pc:docMk/>
+          <pc:sldMk cId="458156879" sldId="289"/>
+        </pc:sldMkLst>
+        <pc:spChg chg="mod">
+          <ac:chgData name="Vasileios Ntaoulas" userId="019b8d86-4639-4c0e-a76e-43d098cf21e7" providerId="ADAL" clId="{C7A7ECF9-9CED-4093-8646-78E15AF0EC69}" dt="2023-01-16T17:43:48.912" v="77" actId="20577"/>
+          <ac:spMkLst>
+            <pc:docMk/>
+            <pc:sldMk cId="458156879" sldId="289"/>
+            <ac:spMk id="4" creationId="{315E3981-F0D7-482C-A8E0-6A57700BECA7}"/>
+          </ac:spMkLst>
+        </pc:spChg>
+      </pc:sldChg>
+      <pc:sldChg chg="modSp add mod">
+        <pc:chgData name="Vasileios Ntaoulas" userId="019b8d86-4639-4c0e-a76e-43d098cf21e7" providerId="ADAL" clId="{C7A7ECF9-9CED-4093-8646-78E15AF0EC69}" dt="2023-01-16T17:44:29.758" v="89" actId="14100"/>
+        <pc:sldMkLst>
+          <pc:docMk/>
+          <pc:sldMk cId="660312521" sldId="290"/>
+        </pc:sldMkLst>
+        <pc:spChg chg="mod">
+          <ac:chgData name="Vasileios Ntaoulas" userId="019b8d86-4639-4c0e-a76e-43d098cf21e7" providerId="ADAL" clId="{C7A7ECF9-9CED-4093-8646-78E15AF0EC69}" dt="2023-01-16T17:44:29.758" v="89" actId="14100"/>
+          <ac:spMkLst>
+            <pc:docMk/>
+            <pc:sldMk cId="660312521" sldId="290"/>
+            <ac:spMk id="4" creationId="{BD179B88-D43C-4A31-9A52-3498E9430782}"/>
+          </ac:spMkLst>
+        </pc:spChg>
+      </pc:sldChg>
+      <pc:sldChg chg="addSp delSp modSp add mod">
+        <pc:chgData name="Vasileios Ntaoulas" userId="019b8d86-4639-4c0e-a76e-43d098cf21e7" providerId="ADAL" clId="{C7A7ECF9-9CED-4093-8646-78E15AF0EC69}" dt="2023-01-16T18:00:06.773" v="238" actId="20577"/>
+        <pc:sldMkLst>
+          <pc:docMk/>
+          <pc:sldMk cId="1860213860" sldId="291"/>
+        </pc:sldMkLst>
+        <pc:spChg chg="mod">
+          <ac:chgData name="Vasileios Ntaoulas" userId="019b8d86-4639-4c0e-a76e-43d098cf21e7" providerId="ADAL" clId="{C7A7ECF9-9CED-4093-8646-78E15AF0EC69}" dt="2023-01-16T17:52:55.539" v="143" actId="20577"/>
+          <ac:spMkLst>
+            <pc:docMk/>
+            <pc:sldMk cId="1860213860" sldId="291"/>
+            <ac:spMk id="4" creationId="{315E3981-F0D7-482C-A8E0-6A57700BECA7}"/>
+          </ac:spMkLst>
+        </pc:spChg>
+        <pc:spChg chg="mod">
+          <ac:chgData name="Vasileios Ntaoulas" userId="019b8d86-4639-4c0e-a76e-43d098cf21e7" providerId="ADAL" clId="{C7A7ECF9-9CED-4093-8646-78E15AF0EC69}" dt="2023-01-16T18:00:06.773" v="238" actId="20577"/>
+          <ac:spMkLst>
+            <pc:docMk/>
+            <pc:sldMk cId="1860213860" sldId="291"/>
+            <ac:spMk id="7" creationId="{B74126B4-1E6C-4FFF-9282-40E18A85A07F}"/>
+          </ac:spMkLst>
+        </pc:spChg>
+        <pc:picChg chg="add mod">
+          <ac:chgData name="Vasileios Ntaoulas" userId="019b8d86-4639-4c0e-a76e-43d098cf21e7" providerId="ADAL" clId="{C7A7ECF9-9CED-4093-8646-78E15AF0EC69}" dt="2023-01-16T18:00:00.508" v="215" actId="1076"/>
+          <ac:picMkLst>
+            <pc:docMk/>
+            <pc:sldMk cId="1860213860" sldId="291"/>
+            <ac:picMk id="5" creationId="{B69555C9-7325-6F14-D9A5-37C0EA259D7A}"/>
+          </ac:picMkLst>
+        </pc:picChg>
+        <pc:picChg chg="add del">
+          <ac:chgData name="Vasileios Ntaoulas" userId="019b8d86-4639-4c0e-a76e-43d098cf21e7" providerId="ADAL" clId="{C7A7ECF9-9CED-4093-8646-78E15AF0EC69}" dt="2023-01-16T17:54:30.028" v="154" actId="478"/>
+          <ac:picMkLst>
+            <pc:docMk/>
+            <pc:sldMk cId="1860213860" sldId="291"/>
+            <ac:picMk id="15" creationId="{D9589739-B711-59A2-F023-EFC9A664C867}"/>
+          </ac:picMkLst>
+        </pc:picChg>
+      </pc:sldChg>
+      <pc:sldChg chg="delSp modSp add mod">
+        <pc:chgData name="Vasileios Ntaoulas" userId="019b8d86-4639-4c0e-a76e-43d098cf21e7" providerId="ADAL" clId="{C7A7ECF9-9CED-4093-8646-78E15AF0EC69}" dt="2023-01-16T18:11:58.323" v="516" actId="478"/>
+        <pc:sldMkLst>
+          <pc:docMk/>
+          <pc:sldMk cId="905488132" sldId="292"/>
+        </pc:sldMkLst>
+        <pc:spChg chg="mod">
+          <ac:chgData name="Vasileios Ntaoulas" userId="019b8d86-4639-4c0e-a76e-43d098cf21e7" providerId="ADAL" clId="{C7A7ECF9-9CED-4093-8646-78E15AF0EC69}" dt="2023-01-16T18:09:03.724" v="488" actId="20577"/>
+          <ac:spMkLst>
+            <pc:docMk/>
+            <pc:sldMk cId="905488132" sldId="292"/>
+            <ac:spMk id="4" creationId="{315E3981-F0D7-482C-A8E0-6A57700BECA7}"/>
+          </ac:spMkLst>
+        </pc:spChg>
+        <pc:spChg chg="mod">
+          <ac:chgData name="Vasileios Ntaoulas" userId="019b8d86-4639-4c0e-a76e-43d098cf21e7" providerId="ADAL" clId="{C7A7ECF9-9CED-4093-8646-78E15AF0EC69}" dt="2023-01-16T18:11:55.729" v="514" actId="114"/>
+          <ac:spMkLst>
+            <pc:docMk/>
+            <pc:sldMk cId="905488132" sldId="292"/>
+            <ac:spMk id="7" creationId="{B74126B4-1E6C-4FFF-9282-40E18A85A07F}"/>
+          </ac:spMkLst>
+        </pc:spChg>
+        <pc:picChg chg="del">
+          <ac:chgData name="Vasileios Ntaoulas" userId="019b8d86-4639-4c0e-a76e-43d098cf21e7" providerId="ADAL" clId="{C7A7ECF9-9CED-4093-8646-78E15AF0EC69}" dt="2023-01-16T18:11:57.724" v="515" actId="478"/>
+          <ac:picMkLst>
+            <pc:docMk/>
+            <pc:sldMk cId="905488132" sldId="292"/>
+            <ac:picMk id="5" creationId="{B69555C9-7325-6F14-D9A5-37C0EA259D7A}"/>
+          </ac:picMkLst>
+        </pc:picChg>
+        <pc:picChg chg="del">
+          <ac:chgData name="Vasileios Ntaoulas" userId="019b8d86-4639-4c0e-a76e-43d098cf21e7" providerId="ADAL" clId="{C7A7ECF9-9CED-4093-8646-78E15AF0EC69}" dt="2023-01-16T18:11:58.323" v="516" actId="478"/>
+          <ac:picMkLst>
+            <pc:docMk/>
+            <pc:sldMk cId="905488132" sldId="292"/>
+            <ac:picMk id="15" creationId="{D9589739-B711-59A2-F023-EFC9A664C867}"/>
+          </ac:picMkLst>
+        </pc:picChg>
+      </pc:sldChg>
+    </pc:docChg>
+  </pc:docChgLst>
+</pc:chgInfo>
 </file>
 
 <file path=ppt/charts/chart1.xml><?xml version="1.0" encoding="utf-8"?>
@@ -1151,7 +1415,7 @@
           <a:p>
             <a:fld id="{1CA5457B-CDAE-4DEB-AEC8-C82DE2312E37}" type="datetimeFigureOut">
               <a:rPr lang="en-US" smtClean="0"/>
-              <a:t>1/5/2023</a:t>
+              <a:t>1/16/2023</a:t>
             </a:fld>
             <a:endParaRPr lang="en-US" dirty="0"/>
           </a:p>
@@ -1328,7 +1592,7 @@
           <a:p>
             <a:fld id="{090B78EA-28CE-41D8-9043-90E391E5F567}" type="datetimeFigureOut">
               <a:rPr lang="en-US" noProof="0" smtClean="0"/>
-              <a:t>1/5/2023</a:t>
+              <a:t>1/16/2023</a:t>
             </a:fld>
             <a:endParaRPr lang="en-US" noProof="0" dirty="0"/>
           </a:p>
@@ -26497,6 +26761,547 @@
           <p:cNvPr id="4" name="Title 3">
             <a:extLst>
               <a:ext uri="{FF2B5EF4-FFF2-40B4-BE49-F238E27FC236}">
+                <a16:creationId xmlns:a16="http://schemas.microsoft.com/office/drawing/2014/main" id="{BD179B88-D43C-4A31-9A52-3498E9430782}"/>
+              </a:ext>
+            </a:extLst>
+          </p:cNvPr>
+          <p:cNvSpPr>
+            <a:spLocks noGrp="1"/>
+          </p:cNvSpPr>
+          <p:nvPr>
+            <p:ph type="title"/>
+          </p:nvPr>
+        </p:nvSpPr>
+        <p:spPr/>
+        <p:txBody>
+          <a:bodyPr>
+            <a:normAutofit fontScale="90000"/>
+          </a:bodyPr>
+          <a:lstStyle/>
+          <a:p>
+            <a:r>
+              <a:rPr lang="en-US" i="1" dirty="0"/>
+              <a:t>Top-k </a:t>
+            </a:r>
+            <a:r>
+              <a:rPr lang="en-US" dirty="0"/>
+              <a:t>skyline domination query</a:t>
+            </a:r>
+            <a:endParaRPr lang="en-US" i="1" dirty="0"/>
+          </a:p>
+        </p:txBody>
+      </p:sp>
+      <p:sp>
+        <p:nvSpPr>
+          <p:cNvPr id="2" name="Slide Number Placeholder 1">
+            <a:extLst>
+              <a:ext uri="{FF2B5EF4-FFF2-40B4-BE49-F238E27FC236}">
+                <a16:creationId xmlns:a16="http://schemas.microsoft.com/office/drawing/2014/main" id="{8B065C75-272B-4BB5-BA23-D80E8654D621}"/>
+              </a:ext>
+            </a:extLst>
+          </p:cNvPr>
+          <p:cNvSpPr>
+            <a:spLocks noGrp="1"/>
+          </p:cNvSpPr>
+          <p:nvPr>
+            <p:ph type="sldNum" sz="quarter" idx="12"/>
+          </p:nvPr>
+        </p:nvSpPr>
+        <p:spPr/>
+        <p:txBody>
+          <a:bodyPr/>
+          <a:lstStyle/>
+          <a:p>
+            <a:fld id="{C263D6C4-4840-40CC-AC84-17E24B3B7BDE}" type="slidenum">
+              <a:rPr lang="en-US" smtClean="0"/>
+              <a:pPr/>
+              <a:t>10</a:t>
+            </a:fld>
+            <a:endParaRPr lang="en-US" dirty="0"/>
+          </a:p>
+        </p:txBody>
+      </p:sp>
+    </p:spTree>
+    <p:extLst>
+      <p:ext uri="{BB962C8B-B14F-4D97-AF65-F5344CB8AC3E}">
+        <p14:creationId xmlns:p14="http://schemas.microsoft.com/office/powerpoint/2010/main" val="660312521"/>
+      </p:ext>
+    </p:extLst>
+  </p:cSld>
+  <p:clrMapOvr>
+    <a:masterClrMapping/>
+  </p:clrMapOvr>
+  <mc:AlternateContent xmlns:mc="http://schemas.openxmlformats.org/markup-compatibility/2006" xmlns:p14="http://schemas.microsoft.com/office/powerpoint/2010/main">
+    <mc:Choice Requires="p14">
+      <p:transition spd="med" p14:dur="700">
+        <p:fade/>
+      </p:transition>
+    </mc:Choice>
+    <mc:Fallback xmlns="">
+      <p:transition spd="med">
+        <p:fade/>
+      </p:transition>
+    </mc:Fallback>
+  </mc:AlternateContent>
+</p:sld>
+</file>
+
+<file path=ppt/slides/slide11.xml><?xml version="1.0" encoding="utf-8"?>
+<p:sld xmlns:a="http://schemas.openxmlformats.org/drawingml/2006/main" xmlns:r="http://schemas.openxmlformats.org/officeDocument/2006/relationships" xmlns:p="http://schemas.openxmlformats.org/presentationml/2006/main">
+  <p:cSld>
+    <p:spTree>
+      <p:nvGrpSpPr>
+        <p:cNvPr id="1" name=""/>
+        <p:cNvGrpSpPr/>
+        <p:nvPr/>
+      </p:nvGrpSpPr>
+      <p:grpSpPr>
+        <a:xfrm>
+          <a:off x="0" y="0"/>
+          <a:ext cx="0" cy="0"/>
+          <a:chOff x="0" y="0"/>
+          <a:chExt cx="0" cy="0"/>
+        </a:xfrm>
+      </p:grpSpPr>
+      <p:sp>
+        <p:nvSpPr>
+          <p:cNvPr id="4" name="Title 3">
+            <a:extLst>
+              <a:ext uri="{FF2B5EF4-FFF2-40B4-BE49-F238E27FC236}">
+                <a16:creationId xmlns:a16="http://schemas.microsoft.com/office/drawing/2014/main" id="{315E3981-F0D7-482C-A8E0-6A57700BECA7}"/>
+              </a:ext>
+            </a:extLst>
+          </p:cNvPr>
+          <p:cNvSpPr>
+            <a:spLocks noGrp="1"/>
+          </p:cNvSpPr>
+          <p:nvPr>
+            <p:ph type="title"/>
+          </p:nvPr>
+        </p:nvSpPr>
+        <p:spPr/>
+        <p:txBody>
+          <a:bodyPr/>
+          <a:lstStyle/>
+          <a:p>
+            <a:r>
+              <a:rPr lang="en-US" dirty="0"/>
+              <a:t>Task 3</a:t>
+            </a:r>
+          </a:p>
+        </p:txBody>
+      </p:sp>
+      <p:sp>
+        <p:nvSpPr>
+          <p:cNvPr id="2" name="Slide Number Placeholder 1">
+            <a:extLst>
+              <a:ext uri="{FF2B5EF4-FFF2-40B4-BE49-F238E27FC236}">
+                <a16:creationId xmlns:a16="http://schemas.microsoft.com/office/drawing/2014/main" id="{520FC4EE-F318-4344-9E3C-B950ADB63865}"/>
+              </a:ext>
+            </a:extLst>
+          </p:cNvPr>
+          <p:cNvSpPr>
+            <a:spLocks noGrp="1"/>
+          </p:cNvSpPr>
+          <p:nvPr>
+            <p:ph type="sldNum" sz="quarter" idx="12"/>
+          </p:nvPr>
+        </p:nvSpPr>
+        <p:spPr/>
+        <p:txBody>
+          <a:bodyPr/>
+          <a:lstStyle/>
+          <a:p>
+            <a:fld id="{C263D6C4-4840-40CC-AC84-17E24B3B7BDE}" type="slidenum">
+              <a:rPr lang="en-US" smtClean="0"/>
+              <a:pPr/>
+              <a:t>11</a:t>
+            </a:fld>
+            <a:endParaRPr lang="en-US" dirty="0"/>
+          </a:p>
+        </p:txBody>
+      </p:sp>
+      <p:sp>
+        <p:nvSpPr>
+          <p:cNvPr id="7" name="Text Placeholder 6">
+            <a:extLst>
+              <a:ext uri="{FF2B5EF4-FFF2-40B4-BE49-F238E27FC236}">
+                <a16:creationId xmlns:a16="http://schemas.microsoft.com/office/drawing/2014/main" id="{B74126B4-1E6C-4FFF-9282-40E18A85A07F}"/>
+              </a:ext>
+            </a:extLst>
+          </p:cNvPr>
+          <p:cNvSpPr>
+            <a:spLocks noGrp="1"/>
+          </p:cNvSpPr>
+          <p:nvPr>
+            <p:ph type="body" sz="quarter" idx="1"/>
+          </p:nvPr>
+        </p:nvSpPr>
+        <p:spPr>
+          <a:xfrm>
+            <a:off x="386526" y="1681163"/>
+            <a:ext cx="11418949" cy="823912"/>
+          </a:xfrm>
+        </p:spPr>
+        <p:txBody>
+          <a:bodyPr>
+            <a:normAutofit/>
+          </a:bodyPr>
+          <a:lstStyle/>
+          <a:p>
+            <a:pPr algn="just"/>
+            <a:r>
+              <a:rPr lang="en-US" b="0" dirty="0"/>
+              <a:t>In Task 3, our work was to find the </a:t>
+            </a:r>
+            <a:r>
+              <a:rPr lang="en-US" i="1" dirty="0"/>
+              <a:t>top-k </a:t>
+            </a:r>
+            <a:r>
+              <a:rPr lang="en-US" dirty="0"/>
+              <a:t>dominating</a:t>
+            </a:r>
+            <a:r>
+              <a:rPr lang="en-US" b="0" dirty="0"/>
+              <a:t> points that belong to the </a:t>
+            </a:r>
+            <a:r>
+              <a:rPr lang="en-US" i="1" dirty="0"/>
+              <a:t>skyline</a:t>
+            </a:r>
+            <a:r>
+              <a:rPr lang="en-US" b="0" dirty="0"/>
+              <a:t> set</a:t>
+            </a:r>
+          </a:p>
+        </p:txBody>
+      </p:sp>
+      <p:sp>
+        <p:nvSpPr>
+          <p:cNvPr id="8" name="Text Placeholder 7">
+            <a:extLst>
+              <a:ext uri="{FF2B5EF4-FFF2-40B4-BE49-F238E27FC236}">
+                <a16:creationId xmlns:a16="http://schemas.microsoft.com/office/drawing/2014/main" id="{47DC4E62-1A34-4F98-A451-214F1808519C}"/>
+              </a:ext>
+            </a:extLst>
+          </p:cNvPr>
+          <p:cNvSpPr>
+            <a:spLocks noGrp="1"/>
+          </p:cNvSpPr>
+          <p:nvPr>
+            <p:ph type="body" sz="quarter" idx="2"/>
+          </p:nvPr>
+        </p:nvSpPr>
+        <p:spPr>
+          <a:xfrm>
+            <a:off x="6892801" y="2567781"/>
+            <a:ext cx="5157787" cy="3684588"/>
+          </a:xfrm>
+        </p:spPr>
+        <p:txBody>
+          <a:bodyPr/>
+          <a:lstStyle/>
+          <a:p>
+            <a:r>
+              <a:rPr lang="en-US" dirty="0"/>
+              <a:t>Lorem ipsum dolor sit amet, consectetuer adipiscing elit. Maecenas porttitor congue massa. Fusce posuere, magna sed pulvinar ultricies, purus lectus malesuada libero, sit amet commodo magna eros quis urna. Nunc viverra imperdiet enim. Fusce est. Vivamus a tellus.</a:t>
+            </a:r>
+          </a:p>
+          <a:p>
+            <a:r>
+              <a:rPr lang="en-US" dirty="0"/>
+              <a:t>Pellentesque habitant morbi tristique senectus et netus et malesuada fames ac turpis egestas. Proin pharetra nonummy pede. Mauris et orci.</a:t>
+            </a:r>
+          </a:p>
+          <a:p>
+            <a:endParaRPr lang="en-US" dirty="0"/>
+          </a:p>
+          <a:p>
+            <a:endParaRPr lang="en-US" dirty="0"/>
+          </a:p>
+        </p:txBody>
+      </p:sp>
+    </p:spTree>
+    <p:extLst>
+      <p:ext uri="{BB962C8B-B14F-4D97-AF65-F5344CB8AC3E}">
+        <p14:creationId xmlns:p14="http://schemas.microsoft.com/office/powerpoint/2010/main" val="905488132"/>
+      </p:ext>
+    </p:extLst>
+  </p:cSld>
+  <p:clrMapOvr>
+    <a:masterClrMapping/>
+  </p:clrMapOvr>
+  <mc:AlternateContent xmlns:mc="http://schemas.openxmlformats.org/markup-compatibility/2006" xmlns:p14="http://schemas.microsoft.com/office/powerpoint/2010/main">
+    <mc:Choice Requires="p14">
+      <p:transition spd="med" p14:dur="700">
+        <p:fade/>
+      </p:transition>
+    </mc:Choice>
+    <mc:Fallback xmlns="">
+      <p:transition spd="med">
+        <p:fade/>
+      </p:transition>
+    </mc:Fallback>
+  </mc:AlternateContent>
+</p:sld>
+</file>
+
+<file path=ppt/slides/slide12.xml><?xml version="1.0" encoding="utf-8"?>
+<p:sld xmlns:a="http://schemas.openxmlformats.org/drawingml/2006/main" xmlns:r="http://schemas.openxmlformats.org/officeDocument/2006/relationships" xmlns:p="http://schemas.openxmlformats.org/presentationml/2006/main">
+  <p:cSld>
+    <p:spTree>
+      <p:nvGrpSpPr>
+        <p:cNvPr id="1" name=""/>
+        <p:cNvGrpSpPr/>
+        <p:nvPr/>
+      </p:nvGrpSpPr>
+      <p:grpSpPr>
+        <a:xfrm>
+          <a:off x="0" y="0"/>
+          <a:ext cx="0" cy="0"/>
+          <a:chOff x="0" y="0"/>
+          <a:chExt cx="0" cy="0"/>
+        </a:xfrm>
+      </p:grpSpPr>
+      <p:sp>
+        <p:nvSpPr>
+          <p:cNvPr id="4" name="Title 3">
+            <a:extLst>
+              <a:ext uri="{FF2B5EF4-FFF2-40B4-BE49-F238E27FC236}">
+                <a16:creationId xmlns:a16="http://schemas.microsoft.com/office/drawing/2014/main" id="{315E3981-F0D7-482C-A8E0-6A57700BECA7}"/>
+              </a:ext>
+            </a:extLst>
+          </p:cNvPr>
+          <p:cNvSpPr>
+            <a:spLocks noGrp="1"/>
+          </p:cNvSpPr>
+          <p:nvPr>
+            <p:ph type="title"/>
+          </p:nvPr>
+        </p:nvSpPr>
+        <p:spPr/>
+        <p:txBody>
+          <a:bodyPr/>
+          <a:lstStyle/>
+          <a:p>
+            <a:r>
+              <a:rPr lang="en-US" dirty="0"/>
+              <a:t>Task 3</a:t>
+            </a:r>
+          </a:p>
+        </p:txBody>
+      </p:sp>
+      <p:sp>
+        <p:nvSpPr>
+          <p:cNvPr id="2" name="Slide Number Placeholder 1">
+            <a:extLst>
+              <a:ext uri="{FF2B5EF4-FFF2-40B4-BE49-F238E27FC236}">
+                <a16:creationId xmlns:a16="http://schemas.microsoft.com/office/drawing/2014/main" id="{520FC4EE-F318-4344-9E3C-B950ADB63865}"/>
+              </a:ext>
+            </a:extLst>
+          </p:cNvPr>
+          <p:cNvSpPr>
+            <a:spLocks noGrp="1"/>
+          </p:cNvSpPr>
+          <p:nvPr>
+            <p:ph type="sldNum" sz="quarter" idx="12"/>
+          </p:nvPr>
+        </p:nvSpPr>
+        <p:spPr/>
+        <p:txBody>
+          <a:bodyPr/>
+          <a:lstStyle/>
+          <a:p>
+            <a:fld id="{C263D6C4-4840-40CC-AC84-17E24B3B7BDE}" type="slidenum">
+              <a:rPr lang="en-US" smtClean="0"/>
+              <a:pPr/>
+              <a:t>12</a:t>
+            </a:fld>
+            <a:endParaRPr lang="en-US" dirty="0"/>
+          </a:p>
+        </p:txBody>
+      </p:sp>
+      <p:sp>
+        <p:nvSpPr>
+          <p:cNvPr id="7" name="Text Placeholder 6">
+            <a:extLst>
+              <a:ext uri="{FF2B5EF4-FFF2-40B4-BE49-F238E27FC236}">
+                <a16:creationId xmlns:a16="http://schemas.microsoft.com/office/drawing/2014/main" id="{B74126B4-1E6C-4FFF-9282-40E18A85A07F}"/>
+              </a:ext>
+            </a:extLst>
+          </p:cNvPr>
+          <p:cNvSpPr>
+            <a:spLocks noGrp="1"/>
+          </p:cNvSpPr>
+          <p:nvPr>
+            <p:ph type="body" sz="quarter" idx="1"/>
+          </p:nvPr>
+        </p:nvSpPr>
+        <p:spPr/>
+        <p:txBody>
+          <a:bodyPr/>
+          <a:lstStyle/>
+          <a:p>
+            <a:r>
+              <a:rPr lang="en-US" dirty="0"/>
+              <a:t>Lorem ipsum dolor sit amet</a:t>
+            </a:r>
+          </a:p>
+        </p:txBody>
+      </p:sp>
+      <p:sp>
+        <p:nvSpPr>
+          <p:cNvPr id="5" name="Text Placeholder 4">
+            <a:extLst>
+              <a:ext uri="{FF2B5EF4-FFF2-40B4-BE49-F238E27FC236}">
+                <a16:creationId xmlns:a16="http://schemas.microsoft.com/office/drawing/2014/main" id="{E0C87788-476B-4620-8002-A5C1177AD6C1}"/>
+              </a:ext>
+            </a:extLst>
+          </p:cNvPr>
+          <p:cNvSpPr>
+            <a:spLocks noGrp="1"/>
+          </p:cNvSpPr>
+          <p:nvPr>
+            <p:ph type="body" sz="quarter" idx="3"/>
+          </p:nvPr>
+        </p:nvSpPr>
+        <p:spPr/>
+        <p:txBody>
+          <a:bodyPr/>
+          <a:lstStyle/>
+          <a:p>
+            <a:r>
+              <a:rPr lang="en-US" dirty="0"/>
+              <a:t>Lorem ipsum dolor sit amet</a:t>
+            </a:r>
+          </a:p>
+        </p:txBody>
+      </p:sp>
+      <p:sp>
+        <p:nvSpPr>
+          <p:cNvPr id="8" name="Text Placeholder 7">
+            <a:extLst>
+              <a:ext uri="{FF2B5EF4-FFF2-40B4-BE49-F238E27FC236}">
+                <a16:creationId xmlns:a16="http://schemas.microsoft.com/office/drawing/2014/main" id="{47DC4E62-1A34-4F98-A451-214F1808519C}"/>
+              </a:ext>
+            </a:extLst>
+          </p:cNvPr>
+          <p:cNvSpPr>
+            <a:spLocks noGrp="1"/>
+          </p:cNvSpPr>
+          <p:nvPr>
+            <p:ph type="body" sz="quarter" idx="2"/>
+          </p:nvPr>
+        </p:nvSpPr>
+        <p:spPr/>
+        <p:txBody>
+          <a:bodyPr/>
+          <a:lstStyle/>
+          <a:p>
+            <a:r>
+              <a:rPr lang="en-US" dirty="0"/>
+              <a:t>Lorem ipsum dolor sit amet, consectetuer adipiscing elit. Maecenas porttitor congue massa. Fusce posuere, magna sed pulvinar ultricies, purus lectus malesuada libero, sit amet commodo magna eros quis urna. Nunc viverra imperdiet enim. Fusce est. Vivamus a tellus.</a:t>
+            </a:r>
+          </a:p>
+          <a:p>
+            <a:r>
+              <a:rPr lang="en-US" dirty="0"/>
+              <a:t>Pellentesque habitant morbi tristique senectus et netus et malesuada fames ac turpis egestas. Proin pharetra nonummy pede. Mauris et orci.</a:t>
+            </a:r>
+          </a:p>
+          <a:p>
+            <a:endParaRPr lang="en-US" dirty="0"/>
+          </a:p>
+          <a:p>
+            <a:endParaRPr lang="en-US" dirty="0"/>
+          </a:p>
+        </p:txBody>
+      </p:sp>
+      <p:sp>
+        <p:nvSpPr>
+          <p:cNvPr id="6" name="Text Placeholder 5">
+            <a:extLst>
+              <a:ext uri="{FF2B5EF4-FFF2-40B4-BE49-F238E27FC236}">
+                <a16:creationId xmlns:a16="http://schemas.microsoft.com/office/drawing/2014/main" id="{000A9570-5EF6-4AFB-9FCA-7C8998E3FEB1}"/>
+              </a:ext>
+            </a:extLst>
+          </p:cNvPr>
+          <p:cNvSpPr>
+            <a:spLocks noGrp="1"/>
+          </p:cNvSpPr>
+          <p:nvPr>
+            <p:ph type="body" sz="quarter" idx="4"/>
+          </p:nvPr>
+        </p:nvSpPr>
+        <p:spPr/>
+        <p:txBody>
+          <a:bodyPr/>
+          <a:lstStyle/>
+          <a:p>
+            <a:r>
+              <a:rPr lang="en-US" dirty="0"/>
+              <a:t>Lorem ipsum dolor sit amet, consectetuer adipiscing elit. Maecenas porttitor congue massa. Fusce posuere, magna sed pulvinar ultricies, purus lectus malesuada libero, sit amet commodo magna eros quis urna. Nunc viverra imperdiet enim. Fusce est. Vivamus a tellus.</a:t>
+            </a:r>
+          </a:p>
+          <a:p>
+            <a:r>
+              <a:rPr lang="en-US" dirty="0"/>
+              <a:t>Pellentesque habitant morbi tristique senectus et netus et malesuada fames ac turpis egestas. Proin pharetra nonummy pede. Mauris et orci.</a:t>
+            </a:r>
+          </a:p>
+          <a:p>
+            <a:endParaRPr lang="en-US" dirty="0"/>
+          </a:p>
+        </p:txBody>
+      </p:sp>
+    </p:spTree>
+    <p:extLst>
+      <p:ext uri="{BB962C8B-B14F-4D97-AF65-F5344CB8AC3E}">
+        <p14:creationId xmlns:p14="http://schemas.microsoft.com/office/powerpoint/2010/main" val="2229238531"/>
+      </p:ext>
+    </p:extLst>
+  </p:cSld>
+  <p:clrMapOvr>
+    <a:masterClrMapping/>
+  </p:clrMapOvr>
+  <mc:AlternateContent xmlns:mc="http://schemas.openxmlformats.org/markup-compatibility/2006" xmlns:p14="http://schemas.microsoft.com/office/powerpoint/2010/main">
+    <mc:Choice Requires="p14">
+      <p:transition spd="med" p14:dur="700">
+        <p:fade/>
+      </p:transition>
+    </mc:Choice>
+    <mc:Fallback xmlns="">
+      <p:transition spd="med">
+        <p:fade/>
+      </p:transition>
+    </mc:Fallback>
+  </mc:AlternateContent>
+</p:sld>
+</file>
+
+<file path=ppt/slides/slide13.xml><?xml version="1.0" encoding="utf-8"?>
+<p:sld xmlns:a="http://schemas.openxmlformats.org/drawingml/2006/main" xmlns:r="http://schemas.openxmlformats.org/officeDocument/2006/relationships" xmlns:p="http://schemas.openxmlformats.org/presentationml/2006/main">
+  <p:cSld>
+    <p:spTree>
+      <p:nvGrpSpPr>
+        <p:cNvPr id="1" name=""/>
+        <p:cNvGrpSpPr/>
+        <p:nvPr/>
+      </p:nvGrpSpPr>
+      <p:grpSpPr>
+        <a:xfrm>
+          <a:off x="0" y="0"/>
+          <a:ext cx="0" cy="0"/>
+          <a:chOff x="0" y="0"/>
+          <a:chExt cx="0" cy="0"/>
+        </a:xfrm>
+      </p:grpSpPr>
+      <p:sp>
+        <p:nvSpPr>
+          <p:cNvPr id="4" name="Title 3">
+            <a:extLst>
+              <a:ext uri="{FF2B5EF4-FFF2-40B4-BE49-F238E27FC236}">
                 <a16:creationId xmlns:a16="http://schemas.microsoft.com/office/drawing/2014/main" id="{315E3981-F0D7-482C-A8E0-6A57700BECA7}"/>
               </a:ext>
             </a:extLst>
@@ -26859,7 +27664,7 @@
             <a:fld id="{C263D6C4-4840-40CC-AC84-17E24B3B7BDE}" type="slidenum">
               <a:rPr lang="en-US" smtClean="0"/>
               <a:pPr/>
-              <a:t>10</a:t>
+              <a:t>13</a:t>
             </a:fld>
             <a:endParaRPr lang="en-US" dirty="0"/>
           </a:p>
@@ -26890,7 +27695,7 @@
 </p:sld>
 </file>
 
-<file path=ppt/slides/slide11.xml><?xml version="1.0" encoding="utf-8"?>
+<file path=ppt/slides/slide14.xml><?xml version="1.0" encoding="utf-8"?>
 <p:sld xmlns:a="http://schemas.openxmlformats.org/drawingml/2006/main" xmlns:r="http://schemas.openxmlformats.org/officeDocument/2006/relationships" xmlns:p="http://schemas.openxmlformats.org/presentationml/2006/main">
   <p:cSld>
     <p:spTree>
@@ -27074,7 +27879,7 @@
             <a:fld id="{C263D6C4-4840-40CC-AC84-17E24B3B7BDE}" type="slidenum">
               <a:rPr lang="en-US" smtClean="0"/>
               <a:pPr/>
-              <a:t>11</a:t>
+              <a:t>14</a:t>
             </a:fld>
             <a:endParaRPr lang="en-US" dirty="0"/>
           </a:p>
@@ -27105,7 +27910,7 @@
 </p:sld>
 </file>
 
-<file path=ppt/slides/slide12.xml><?xml version="1.0" encoding="utf-8"?>
+<file path=ppt/slides/slide15.xml><?xml version="1.0" encoding="utf-8"?>
 <p:sld xmlns:a="http://schemas.openxmlformats.org/drawingml/2006/main" xmlns:r="http://schemas.openxmlformats.org/officeDocument/2006/relationships" xmlns:p="http://schemas.openxmlformats.org/presentationml/2006/main">
   <p:cSld>
     <p:spTree>
@@ -27242,7 +28047,7 @@
             <a:fld id="{C263D6C4-4840-40CC-AC84-17E24B3B7BDE}" type="slidenum">
               <a:rPr lang="en-US" smtClean="0"/>
               <a:pPr/>
-              <a:t>12</a:t>
+              <a:t>15</a:t>
             </a:fld>
             <a:endParaRPr lang="en-US" dirty="0"/>
           </a:p>
@@ -27273,7 +28078,7 @@
 </p:sld>
 </file>
 
-<file path=ppt/slides/slide13.xml><?xml version="1.0" encoding="utf-8"?>
+<file path=ppt/slides/slide16.xml><?xml version="1.0" encoding="utf-8"?>
 <p:sld xmlns:a="http://schemas.openxmlformats.org/drawingml/2006/main" xmlns:r="http://schemas.openxmlformats.org/officeDocument/2006/relationships" xmlns:p="http://schemas.openxmlformats.org/presentationml/2006/main">
   <p:cSld>
     <p:spTree>
@@ -29163,7 +29968,7 @@
             <a:fld id="{C263D6C4-4840-40CC-AC84-17E24B3B7BDE}" type="slidenum">
               <a:rPr lang="en-US" smtClean="0"/>
               <a:pPr/>
-              <a:t>13</a:t>
+              <a:t>16</a:t>
             </a:fld>
             <a:endParaRPr lang="en-US" dirty="0"/>
           </a:p>
@@ -29194,7 +29999,7 @@
 </p:sld>
 </file>
 
-<file path=ppt/slides/slide14.xml><?xml version="1.0" encoding="utf-8"?>
+<file path=ppt/slides/slide17.xml><?xml version="1.0" encoding="utf-8"?>
 <p:sld xmlns:a="http://schemas.openxmlformats.org/drawingml/2006/main" xmlns:r="http://schemas.openxmlformats.org/officeDocument/2006/relationships" xmlns:p="http://schemas.openxmlformats.org/presentationml/2006/main">
   <p:cSld>
     <p:spTree>
@@ -29252,7 +30057,7 @@
           <p:nvPr>
             <p:extLst>
               <p:ext uri="{D42A27DB-BD31-4B8C-83A1-F6EECF244321}">
-                <p14:modId xmlns:p14="http://schemas.microsoft.com/office/powerpoint/2010/main" val="654825679"/>
+                <p14:modId xmlns:p14="http://schemas.microsoft.com/office/powerpoint/2010/main" val="2366121754"/>
               </p:ext>
             </p:extLst>
           </p:nvPr>
@@ -29291,7 +30096,7 @@
             <a:fld id="{C263D6C4-4840-40CC-AC84-17E24B3B7BDE}" type="slidenum">
               <a:rPr lang="en-US" smtClean="0"/>
               <a:pPr/>
-              <a:t>14</a:t>
+              <a:t>17</a:t>
             </a:fld>
             <a:endParaRPr lang="en-US" dirty="0"/>
           </a:p>
@@ -29322,7 +30127,7 @@
 </p:sld>
 </file>
 
-<file path=ppt/slides/slide15.xml><?xml version="1.0" encoding="utf-8"?>
+<file path=ppt/slides/slide18.xml><?xml version="1.0" encoding="utf-8"?>
 <p:sld xmlns:a="http://schemas.openxmlformats.org/drawingml/2006/main" xmlns:r="http://schemas.openxmlformats.org/officeDocument/2006/relationships" xmlns:p="http://schemas.openxmlformats.org/presentationml/2006/main">
   <p:cSld>
     <p:spTree>
@@ -29403,6 +30208,177 @@
       </p:grpSpPr>
       <p:sp>
         <p:nvSpPr>
+          <p:cNvPr id="7" name="Title 6">
+            <a:extLst>
+              <a:ext uri="{FF2B5EF4-FFF2-40B4-BE49-F238E27FC236}">
+                <a16:creationId xmlns:a16="http://schemas.microsoft.com/office/drawing/2014/main" id="{7875C19A-1AAE-476A-A316-A2CF92D763D3}"/>
+              </a:ext>
+            </a:extLst>
+          </p:cNvPr>
+          <p:cNvSpPr>
+            <a:spLocks noGrp="1"/>
+          </p:cNvSpPr>
+          <p:nvPr>
+            <p:ph type="title"/>
+          </p:nvPr>
+        </p:nvSpPr>
+        <p:spPr>
+          <a:xfrm>
+            <a:off x="444500" y="542925"/>
+            <a:ext cx="11214100" cy="590931"/>
+          </a:xfrm>
+        </p:spPr>
+        <p:txBody>
+          <a:bodyPr/>
+          <a:lstStyle/>
+          <a:p>
+            <a:r>
+              <a:rPr lang="en-US" sz="3600" dirty="0"/>
+              <a:t>Project Analysis</a:t>
+            </a:r>
+          </a:p>
+        </p:txBody>
+      </p:sp>
+      <p:sp>
+        <p:nvSpPr>
+          <p:cNvPr id="10" name="Text Placeholder 9">
+            <a:extLst>
+              <a:ext uri="{FF2B5EF4-FFF2-40B4-BE49-F238E27FC236}">
+                <a16:creationId xmlns:a16="http://schemas.microsoft.com/office/drawing/2014/main" id="{EF2BC084-E6DB-4DE7-B309-042A85EBA700}"/>
+              </a:ext>
+            </a:extLst>
+          </p:cNvPr>
+          <p:cNvSpPr>
+            <a:spLocks noGrp="1"/>
+          </p:cNvSpPr>
+          <p:nvPr>
+            <p:ph type="body" sz="quarter" idx="13"/>
+          </p:nvPr>
+        </p:nvSpPr>
+        <p:spPr>
+          <a:xfrm>
+            <a:off x="444500" y="1833203"/>
+            <a:ext cx="6718300" cy="4093243"/>
+          </a:xfrm>
+        </p:spPr>
+        <p:txBody>
+          <a:bodyPr/>
+          <a:lstStyle/>
+          <a:p>
+            <a:r>
+              <a:rPr lang="en-US" sz="2400" dirty="0"/>
+              <a:t>Skyline query</a:t>
+            </a:r>
+          </a:p>
+          <a:p>
+            <a:r>
+              <a:rPr lang="en-US" sz="2400" i="1" dirty="0"/>
+              <a:t>Top-k </a:t>
+            </a:r>
+            <a:r>
+              <a:rPr lang="en-US" sz="2400" dirty="0"/>
+              <a:t>domination query</a:t>
+            </a:r>
+            <a:endParaRPr lang="en-US" sz="2400" i="1" dirty="0"/>
+          </a:p>
+          <a:p>
+            <a:r>
+              <a:rPr lang="en-US" sz="2400" i="1" dirty="0"/>
+              <a:t>Top-k </a:t>
+            </a:r>
+            <a:r>
+              <a:rPr lang="en-US" sz="2400" dirty="0"/>
+              <a:t>skyline</a:t>
+            </a:r>
+            <a:r>
+              <a:rPr lang="en-US" sz="2400" i="1" dirty="0"/>
+              <a:t> </a:t>
+            </a:r>
+            <a:r>
+              <a:rPr lang="en-US" sz="2400" dirty="0"/>
+              <a:t>domination query</a:t>
+            </a:r>
+            <a:endParaRPr lang="en-US" sz="2400" i="1" dirty="0"/>
+          </a:p>
+          <a:p>
+            <a:endParaRPr lang="en-US" dirty="0"/>
+          </a:p>
+        </p:txBody>
+      </p:sp>
+      <p:sp>
+        <p:nvSpPr>
+          <p:cNvPr id="2" name="Slide Number Placeholder 1">
+            <a:extLst>
+              <a:ext uri="{FF2B5EF4-FFF2-40B4-BE49-F238E27FC236}">
+                <a16:creationId xmlns:a16="http://schemas.microsoft.com/office/drawing/2014/main" id="{BE9800F6-D571-48C4-8466-12AA1ADB6599}"/>
+              </a:ext>
+            </a:extLst>
+          </p:cNvPr>
+          <p:cNvSpPr>
+            <a:spLocks noGrp="1"/>
+          </p:cNvSpPr>
+          <p:nvPr>
+            <p:ph type="sldNum" sz="quarter" idx="12"/>
+          </p:nvPr>
+        </p:nvSpPr>
+        <p:spPr/>
+        <p:txBody>
+          <a:bodyPr/>
+          <a:lstStyle/>
+          <a:p>
+            <a:fld id="{C263D6C4-4840-40CC-AC84-17E24B3B7BDE}" type="slidenum">
+              <a:rPr lang="en-US" smtClean="0"/>
+              <a:pPr/>
+              <a:t>2</a:t>
+            </a:fld>
+            <a:endParaRPr lang="en-US" dirty="0"/>
+          </a:p>
+        </p:txBody>
+      </p:sp>
+    </p:spTree>
+    <p:extLst>
+      <p:ext uri="{BB962C8B-B14F-4D97-AF65-F5344CB8AC3E}">
+        <p14:creationId xmlns:p14="http://schemas.microsoft.com/office/powerpoint/2010/main" val="3733486012"/>
+      </p:ext>
+    </p:extLst>
+  </p:cSld>
+  <p:clrMapOvr>
+    <a:masterClrMapping/>
+  </p:clrMapOvr>
+  <mc:AlternateContent xmlns:mc="http://schemas.openxmlformats.org/markup-compatibility/2006" xmlns:p14="http://schemas.microsoft.com/office/powerpoint/2010/main">
+    <mc:Choice Requires="p14">
+      <p:transition spd="med" p14:dur="700">
+        <p:fade/>
+      </p:transition>
+    </mc:Choice>
+    <mc:Fallback xmlns="">
+      <p:transition spd="med">
+        <p:fade/>
+      </p:transition>
+    </mc:Fallback>
+  </mc:AlternateContent>
+</p:sld>
+</file>
+
+<file path=ppt/slides/slide3.xml><?xml version="1.0" encoding="utf-8"?>
+<p:sld xmlns:a="http://schemas.openxmlformats.org/drawingml/2006/main" xmlns:r="http://schemas.openxmlformats.org/officeDocument/2006/relationships" xmlns:p="http://schemas.openxmlformats.org/presentationml/2006/main">
+  <p:cSld>
+    <p:spTree>
+      <p:nvGrpSpPr>
+        <p:cNvPr id="1" name=""/>
+        <p:cNvGrpSpPr/>
+        <p:nvPr/>
+      </p:nvGrpSpPr>
+      <p:grpSpPr>
+        <a:xfrm>
+          <a:off x="0" y="0"/>
+          <a:ext cx="0" cy="0"/>
+          <a:chOff x="0" y="0"/>
+          <a:chExt cx="0" cy="0"/>
+        </a:xfrm>
+      </p:grpSpPr>
+      <p:sp>
+        <p:nvSpPr>
           <p:cNvPr id="4" name="Title 3">
             <a:extLst>
               <a:ext uri="{FF2B5EF4-FFF2-40B4-BE49-F238E27FC236}">
@@ -29453,7 +30429,7 @@
             <a:fld id="{C263D6C4-4840-40CC-AC84-17E24B3B7BDE}" type="slidenum">
               <a:rPr lang="en-US" smtClean="0"/>
               <a:pPr/>
-              <a:t>2</a:t>
+              <a:t>3</a:t>
             </a:fld>
             <a:endParaRPr lang="en-US" dirty="0"/>
           </a:p>
@@ -29484,7 +30460,374 @@
 </p:sld>
 </file>
 
-<file path=ppt/slides/slide3.xml><?xml version="1.0" encoding="utf-8"?>
+<file path=ppt/slides/slide4.xml><?xml version="1.0" encoding="utf-8"?>
+<p:sld xmlns:a="http://schemas.openxmlformats.org/drawingml/2006/main" xmlns:r="http://schemas.openxmlformats.org/officeDocument/2006/relationships" xmlns:p="http://schemas.openxmlformats.org/presentationml/2006/main">
+  <p:cSld>
+    <p:spTree>
+      <p:nvGrpSpPr>
+        <p:cNvPr id="1" name=""/>
+        <p:cNvGrpSpPr/>
+        <p:nvPr/>
+      </p:nvGrpSpPr>
+      <p:grpSpPr>
+        <a:xfrm>
+          <a:off x="0" y="0"/>
+          <a:ext cx="0" cy="0"/>
+          <a:chOff x="0" y="0"/>
+          <a:chExt cx="0" cy="0"/>
+        </a:xfrm>
+      </p:grpSpPr>
+      <p:sp>
+        <p:nvSpPr>
+          <p:cNvPr id="4" name="Title 3">
+            <a:extLst>
+              <a:ext uri="{FF2B5EF4-FFF2-40B4-BE49-F238E27FC236}">
+                <a16:creationId xmlns:a16="http://schemas.microsoft.com/office/drawing/2014/main" id="{315E3981-F0D7-482C-A8E0-6A57700BECA7}"/>
+              </a:ext>
+            </a:extLst>
+          </p:cNvPr>
+          <p:cNvSpPr>
+            <a:spLocks noGrp="1"/>
+          </p:cNvSpPr>
+          <p:nvPr>
+            <p:ph type="title"/>
+          </p:nvPr>
+        </p:nvSpPr>
+        <p:spPr/>
+        <p:txBody>
+          <a:bodyPr/>
+          <a:lstStyle/>
+          <a:p>
+            <a:r>
+              <a:rPr lang="en-US" dirty="0"/>
+              <a:t>Task 1</a:t>
+            </a:r>
+          </a:p>
+        </p:txBody>
+      </p:sp>
+      <p:sp>
+        <p:nvSpPr>
+          <p:cNvPr id="2" name="Slide Number Placeholder 1">
+            <a:extLst>
+              <a:ext uri="{FF2B5EF4-FFF2-40B4-BE49-F238E27FC236}">
+                <a16:creationId xmlns:a16="http://schemas.microsoft.com/office/drawing/2014/main" id="{520FC4EE-F318-4344-9E3C-B950ADB63865}"/>
+              </a:ext>
+            </a:extLst>
+          </p:cNvPr>
+          <p:cNvSpPr>
+            <a:spLocks noGrp="1"/>
+          </p:cNvSpPr>
+          <p:nvPr>
+            <p:ph type="sldNum" sz="quarter" idx="12"/>
+          </p:nvPr>
+        </p:nvSpPr>
+        <p:spPr/>
+        <p:txBody>
+          <a:bodyPr/>
+          <a:lstStyle/>
+          <a:p>
+            <a:fld id="{C263D6C4-4840-40CC-AC84-17E24B3B7BDE}" type="slidenum">
+              <a:rPr lang="en-US" smtClean="0"/>
+              <a:pPr/>
+              <a:t>4</a:t>
+            </a:fld>
+            <a:endParaRPr lang="en-US" dirty="0"/>
+          </a:p>
+        </p:txBody>
+      </p:sp>
+      <p:sp>
+        <p:nvSpPr>
+          <p:cNvPr id="7" name="Text Placeholder 6">
+            <a:extLst>
+              <a:ext uri="{FF2B5EF4-FFF2-40B4-BE49-F238E27FC236}">
+                <a16:creationId xmlns:a16="http://schemas.microsoft.com/office/drawing/2014/main" id="{B74126B4-1E6C-4FFF-9282-40E18A85A07F}"/>
+              </a:ext>
+            </a:extLst>
+          </p:cNvPr>
+          <p:cNvSpPr>
+            <a:spLocks noGrp="1"/>
+          </p:cNvSpPr>
+          <p:nvPr>
+            <p:ph type="body" sz="quarter" idx="1"/>
+          </p:nvPr>
+        </p:nvSpPr>
+        <p:spPr>
+          <a:xfrm>
+            <a:off x="386526" y="1681163"/>
+            <a:ext cx="11418949" cy="823912"/>
+          </a:xfrm>
+        </p:spPr>
+        <p:txBody>
+          <a:bodyPr>
+            <a:normAutofit/>
+          </a:bodyPr>
+          <a:lstStyle/>
+          <a:p>
+            <a:pPr algn="just"/>
+            <a:r>
+              <a:rPr lang="en-US" b="0" dirty="0"/>
+              <a:t>The </a:t>
+            </a:r>
+            <a:r>
+              <a:rPr lang="en-US" dirty="0"/>
+              <a:t>skyline</a:t>
+            </a:r>
+            <a:r>
+              <a:rPr lang="en-US" b="0" dirty="0"/>
+              <a:t> is a set of points that are not dominated</a:t>
+            </a:r>
+            <a:r>
+              <a:rPr lang="el-GR" b="0" dirty="0"/>
+              <a:t>*</a:t>
+            </a:r>
+            <a:r>
+              <a:rPr lang="en-US" b="0" dirty="0"/>
+              <a:t> by any other point. Those points are called skyline points.</a:t>
+            </a:r>
+          </a:p>
+        </p:txBody>
+      </p:sp>
+      <p:sp>
+        <p:nvSpPr>
+          <p:cNvPr id="8" name="Text Placeholder 7">
+            <a:extLst>
+              <a:ext uri="{FF2B5EF4-FFF2-40B4-BE49-F238E27FC236}">
+                <a16:creationId xmlns:a16="http://schemas.microsoft.com/office/drawing/2014/main" id="{47DC4E62-1A34-4F98-A451-214F1808519C}"/>
+              </a:ext>
+            </a:extLst>
+          </p:cNvPr>
+          <p:cNvSpPr>
+            <a:spLocks noGrp="1"/>
+          </p:cNvSpPr>
+          <p:nvPr>
+            <p:ph type="body" sz="quarter" idx="2"/>
+          </p:nvPr>
+        </p:nvSpPr>
+        <p:spPr>
+          <a:xfrm>
+            <a:off x="6892801" y="2567781"/>
+            <a:ext cx="5157787" cy="3684588"/>
+          </a:xfrm>
+        </p:spPr>
+        <p:txBody>
+          <a:bodyPr/>
+          <a:lstStyle/>
+          <a:p>
+            <a:r>
+              <a:rPr lang="en-US" dirty="0"/>
+              <a:t>Lorem ipsum dolor sit amet, consectetuer adipiscing elit. Maecenas porttitor congue massa. Fusce posuere, magna sed pulvinar ultricies, purus lectus malesuada libero, sit amet commodo magna eros quis urna. Nunc viverra imperdiet enim. Fusce est. Vivamus a tellus.</a:t>
+            </a:r>
+          </a:p>
+          <a:p>
+            <a:r>
+              <a:rPr lang="en-US" dirty="0"/>
+              <a:t>Pellentesque habitant morbi tristique senectus et netus et malesuada fames ac turpis egestas. Proin pharetra nonummy pede. Mauris et orci.</a:t>
+            </a:r>
+          </a:p>
+          <a:p>
+            <a:endParaRPr lang="en-US" dirty="0"/>
+          </a:p>
+          <a:p>
+            <a:endParaRPr lang="en-US" dirty="0"/>
+          </a:p>
+        </p:txBody>
+      </p:sp>
+      <p:pic>
+        <p:nvPicPr>
+          <p:cNvPr id="15" name="Picture 14" descr="Chart, scatter chart&#10;&#10;Description automatically generated">
+            <a:extLst>
+              <a:ext uri="{FF2B5EF4-FFF2-40B4-BE49-F238E27FC236}">
+                <a16:creationId xmlns:a16="http://schemas.microsoft.com/office/drawing/2014/main" id="{D9589739-B711-59A2-F023-EFC9A664C867}"/>
+              </a:ext>
+            </a:extLst>
+          </p:cNvPr>
+          <p:cNvPicPr>
+            <a:picLocks noChangeAspect="1"/>
+          </p:cNvPicPr>
+          <p:nvPr/>
+        </p:nvPicPr>
+        <p:blipFill>
+          <a:blip r:embed="rId2"/>
+          <a:stretch>
+            <a:fillRect/>
+          </a:stretch>
+        </p:blipFill>
+        <p:spPr>
+          <a:xfrm>
+            <a:off x="465118" y="2446315"/>
+            <a:ext cx="3684588" cy="3684588"/>
+          </a:xfrm>
+          <a:prstGeom prst="rect">
+            <a:avLst/>
+          </a:prstGeom>
+        </p:spPr>
+      </p:pic>
+      <p:sp>
+        <p:nvSpPr>
+          <p:cNvPr id="16" name="TextBox 15">
+            <a:extLst>
+              <a:ext uri="{FF2B5EF4-FFF2-40B4-BE49-F238E27FC236}">
+                <a16:creationId xmlns:a16="http://schemas.microsoft.com/office/drawing/2014/main" id="{6E9C669F-25DE-441B-66D9-A361F6749E30}"/>
+              </a:ext>
+            </a:extLst>
+          </p:cNvPr>
+          <p:cNvSpPr txBox="1"/>
+          <p:nvPr/>
+        </p:nvSpPr>
+        <p:spPr>
+          <a:xfrm>
+            <a:off x="6051550" y="6189663"/>
+            <a:ext cx="5058888" cy="430887"/>
+          </a:xfrm>
+          <a:prstGeom prst="rect">
+            <a:avLst/>
+          </a:prstGeom>
+          <a:noFill/>
+        </p:spPr>
+        <p:txBody>
+          <a:bodyPr wrap="square" rtlCol="0">
+            <a:spAutoFit/>
+          </a:bodyPr>
+          <a:lstStyle/>
+          <a:p>
+            <a:r>
+              <a:rPr lang="el-GR" sz="1100" dirty="0">
+                <a:solidFill>
+                  <a:schemeClr val="bg1"/>
+                </a:solidFill>
+              </a:rPr>
+              <a:t>*</a:t>
+            </a:r>
+            <a:r>
+              <a:rPr lang="en-US" sz="1100" dirty="0">
+                <a:solidFill>
+                  <a:schemeClr val="bg1"/>
+                </a:solidFill>
+              </a:rPr>
+              <a:t>One point </a:t>
+            </a:r>
+            <a:r>
+              <a:rPr lang="en-US" sz="1100" i="1" dirty="0">
+                <a:solidFill>
+                  <a:schemeClr val="bg1"/>
+                </a:solidFill>
+              </a:rPr>
+              <a:t>p </a:t>
+            </a:r>
+            <a:r>
+              <a:rPr lang="en-US" sz="1100" b="1" dirty="0">
+                <a:solidFill>
+                  <a:schemeClr val="bg1"/>
+                </a:solidFill>
+              </a:rPr>
+              <a:t>dominates </a:t>
+            </a:r>
+            <a:r>
+              <a:rPr lang="en-US" sz="1100" dirty="0">
+                <a:solidFill>
+                  <a:schemeClr val="bg1"/>
+                </a:solidFill>
+              </a:rPr>
+              <a:t>another point </a:t>
+            </a:r>
+            <a:r>
+              <a:rPr lang="en-US" sz="1100" i="1" dirty="0">
+                <a:solidFill>
+                  <a:schemeClr val="bg1"/>
+                </a:solidFill>
+              </a:rPr>
+              <a:t>q</a:t>
+            </a:r>
+            <a:r>
+              <a:rPr lang="en-US" sz="1100" dirty="0">
+                <a:solidFill>
+                  <a:schemeClr val="bg1"/>
+                </a:solidFill>
+              </a:rPr>
+              <a:t>, when p is not worse than </a:t>
+            </a:r>
+            <a:r>
+              <a:rPr lang="en-US" sz="1100" i="1" dirty="0">
+                <a:solidFill>
+                  <a:schemeClr val="bg1"/>
+                </a:solidFill>
+              </a:rPr>
+              <a:t>q </a:t>
+            </a:r>
+            <a:r>
+              <a:rPr lang="en-US" sz="1100" dirty="0">
+                <a:solidFill>
+                  <a:schemeClr val="bg1"/>
+                </a:solidFill>
+              </a:rPr>
+              <a:t>in any of the d-dimensions, or </a:t>
+            </a:r>
+            <a:r>
+              <a:rPr lang="en-US" sz="1100" i="1" dirty="0">
+                <a:solidFill>
+                  <a:schemeClr val="bg1"/>
+                </a:solidFill>
+              </a:rPr>
+              <a:t>p </a:t>
+            </a:r>
+            <a:r>
+              <a:rPr lang="en-US" sz="1100" dirty="0">
+                <a:solidFill>
+                  <a:schemeClr val="bg1"/>
+                </a:solidFill>
+              </a:rPr>
+              <a:t>is better than</a:t>
+            </a:r>
+            <a:r>
+              <a:rPr lang="en-US" sz="1100" i="1" dirty="0">
+                <a:solidFill>
+                  <a:schemeClr val="bg1"/>
+                </a:solidFill>
+              </a:rPr>
+              <a:t> q </a:t>
+            </a:r>
+            <a:r>
+              <a:rPr lang="en-US" sz="1100" dirty="0">
+                <a:solidFill>
+                  <a:schemeClr val="bg1"/>
+                </a:solidFill>
+              </a:rPr>
+              <a:t> in at least one of the d-dimensions.</a:t>
+            </a:r>
+            <a:endParaRPr lang="en-150" sz="1100" b="1" dirty="0">
+              <a:solidFill>
+                <a:schemeClr val="bg1"/>
+              </a:solidFill>
+            </a:endParaRPr>
+          </a:p>
+        </p:txBody>
+      </p:sp>
+    </p:spTree>
+    <p:extLst>
+      <p:ext uri="{BB962C8B-B14F-4D97-AF65-F5344CB8AC3E}">
+        <p14:creationId xmlns:p14="http://schemas.microsoft.com/office/powerpoint/2010/main" val="3607270498"/>
+      </p:ext>
+    </p:extLst>
+  </p:cSld>
+  <p:clrMapOvr>
+    <a:masterClrMapping/>
+  </p:clrMapOvr>
+  <mc:AlternateContent xmlns:mc="http://schemas.openxmlformats.org/markup-compatibility/2006" xmlns:p14="http://schemas.microsoft.com/office/powerpoint/2010/main">
+    <mc:Choice Requires="p14">
+      <p:transition spd="med" p14:dur="700">
+        <p:fade/>
+      </p:transition>
+    </mc:Choice>
+    <mc:Fallback xmlns="">
+      <p:transition spd="med">
+        <p:fade/>
+      </p:transition>
+    </mc:Fallback>
+  </mc:AlternateContent>
+</p:sld>
+</file>
+
+<file path=ppt/slides/slide5.xml><?xml version="1.0" encoding="utf-8"?>
 <p:sld xmlns:a="http://schemas.openxmlformats.org/drawingml/2006/main" xmlns:r="http://schemas.openxmlformats.org/officeDocument/2006/relationships" xmlns:p="http://schemas.openxmlformats.org/presentationml/2006/main">
   <p:cSld>
     <p:spTree>
@@ -29525,7 +30868,7 @@
             <a:fld id="{C263D6C4-4840-40CC-AC84-17E24B3B7BDE}" type="slidenum">
               <a:rPr lang="en-US" noProof="0" smtClean="0"/>
               <a:pPr/>
-              <a:t>3</a:t>
+              <a:t>5</a:t>
             </a:fld>
             <a:endParaRPr lang="en-US" noProof="0" dirty="0"/>
           </a:p>
@@ -29544,7 +30887,7 @@
 </p:sld>
 </file>
 
-<file path=ppt/slides/slide4.xml><?xml version="1.0" encoding="utf-8"?>
+<file path=ppt/slides/slide6.xml><?xml version="1.0" encoding="utf-8"?>
 <p:sld xmlns:a="http://schemas.openxmlformats.org/drawingml/2006/main" xmlns:r="http://schemas.openxmlformats.org/officeDocument/2006/relationships" xmlns:p="http://schemas.openxmlformats.org/presentationml/2006/main">
   <p:cSld>
     <p:spTree>
@@ -29620,7 +30963,7 @@
             <a:fld id="{C263D6C4-4840-40CC-AC84-17E24B3B7BDE}" type="slidenum">
               <a:rPr lang="en-US" smtClean="0"/>
               <a:pPr/>
-              <a:t>4</a:t>
+              <a:t>6</a:t>
             </a:fld>
             <a:endParaRPr lang="en-US" dirty="0"/>
           </a:p>
@@ -29630,206 +30973,6 @@
     <p:extLst>
       <p:ext uri="{BB962C8B-B14F-4D97-AF65-F5344CB8AC3E}">
         <p14:creationId xmlns:p14="http://schemas.microsoft.com/office/powerpoint/2010/main" val="709828751"/>
-      </p:ext>
-    </p:extLst>
-  </p:cSld>
-  <p:clrMapOvr>
-    <a:masterClrMapping/>
-  </p:clrMapOvr>
-  <mc:AlternateContent xmlns:mc="http://schemas.openxmlformats.org/markup-compatibility/2006" xmlns:p14="http://schemas.microsoft.com/office/powerpoint/2010/main">
-    <mc:Choice Requires="p14">
-      <p:transition spd="med" p14:dur="700">
-        <p:fade/>
-      </p:transition>
-    </mc:Choice>
-    <mc:Fallback xmlns="">
-      <p:transition spd="med">
-        <p:fade/>
-      </p:transition>
-    </mc:Fallback>
-  </mc:AlternateContent>
-</p:sld>
-</file>
-
-<file path=ppt/slides/slide5.xml><?xml version="1.0" encoding="utf-8"?>
-<p:sld xmlns:a="http://schemas.openxmlformats.org/drawingml/2006/main" xmlns:r="http://schemas.openxmlformats.org/officeDocument/2006/relationships" xmlns:p="http://schemas.openxmlformats.org/presentationml/2006/main">
-  <p:cSld>
-    <p:spTree>
-      <p:nvGrpSpPr>
-        <p:cNvPr id="1" name=""/>
-        <p:cNvGrpSpPr/>
-        <p:nvPr/>
-      </p:nvGrpSpPr>
-      <p:grpSpPr>
-        <a:xfrm>
-          <a:off x="0" y="0"/>
-          <a:ext cx="0" cy="0"/>
-          <a:chOff x="0" y="0"/>
-          <a:chExt cx="0" cy="0"/>
-        </a:xfrm>
-      </p:grpSpPr>
-      <p:sp>
-        <p:nvSpPr>
-          <p:cNvPr id="2" name="Slide Number Placeholder 1">
-            <a:extLst>
-              <a:ext uri="{FF2B5EF4-FFF2-40B4-BE49-F238E27FC236}">
-                <a16:creationId xmlns:a16="http://schemas.microsoft.com/office/drawing/2014/main" id="{ED5D82C7-8910-CEE9-A138-FEAA3F66FEC7}"/>
-              </a:ext>
-            </a:extLst>
-          </p:cNvPr>
-          <p:cNvSpPr>
-            <a:spLocks noGrp="1"/>
-          </p:cNvSpPr>
-          <p:nvPr>
-            <p:ph type="sldNum" sz="quarter" idx="12"/>
-          </p:nvPr>
-        </p:nvSpPr>
-        <p:spPr/>
-        <p:txBody>
-          <a:bodyPr/>
-          <a:lstStyle/>
-          <a:p>
-            <a:fld id="{C263D6C4-4840-40CC-AC84-17E24B3B7BDE}" type="slidenum">
-              <a:rPr lang="en-US" noProof="0" smtClean="0"/>
-              <a:pPr/>
-              <a:t>5</a:t>
-            </a:fld>
-            <a:endParaRPr lang="en-US" noProof="0" dirty="0"/>
-          </a:p>
-        </p:txBody>
-      </p:sp>
-    </p:spTree>
-    <p:extLst>
-      <p:ext uri="{BB962C8B-B14F-4D97-AF65-F5344CB8AC3E}">
-        <p14:creationId xmlns:p14="http://schemas.microsoft.com/office/powerpoint/2010/main" val="1592003877"/>
-      </p:ext>
-    </p:extLst>
-  </p:cSld>
-  <p:clrMapOvr>
-    <a:masterClrMapping/>
-  </p:clrMapOvr>
-</p:sld>
-</file>
-
-<file path=ppt/slides/slide6.xml><?xml version="1.0" encoding="utf-8"?>
-<p:sld xmlns:a="http://schemas.openxmlformats.org/drawingml/2006/main" xmlns:r="http://schemas.openxmlformats.org/officeDocument/2006/relationships" xmlns:p="http://schemas.openxmlformats.org/presentationml/2006/main">
-  <p:cSld>
-    <p:spTree>
-      <p:nvGrpSpPr>
-        <p:cNvPr id="1" name=""/>
-        <p:cNvGrpSpPr/>
-        <p:nvPr/>
-      </p:nvGrpSpPr>
-      <p:grpSpPr>
-        <a:xfrm>
-          <a:off x="0" y="0"/>
-          <a:ext cx="0" cy="0"/>
-          <a:chOff x="0" y="0"/>
-          <a:chExt cx="0" cy="0"/>
-        </a:xfrm>
-      </p:grpSpPr>
-      <p:sp>
-        <p:nvSpPr>
-          <p:cNvPr id="7" name="Title 6">
-            <a:extLst>
-              <a:ext uri="{FF2B5EF4-FFF2-40B4-BE49-F238E27FC236}">
-                <a16:creationId xmlns:a16="http://schemas.microsoft.com/office/drawing/2014/main" id="{7875C19A-1AAE-476A-A316-A2CF92D763D3}"/>
-              </a:ext>
-            </a:extLst>
-          </p:cNvPr>
-          <p:cNvSpPr>
-            <a:spLocks noGrp="1"/>
-          </p:cNvSpPr>
-          <p:nvPr>
-            <p:ph type="title"/>
-          </p:nvPr>
-        </p:nvSpPr>
-        <p:spPr/>
-        <p:txBody>
-          <a:bodyPr/>
-          <a:lstStyle/>
-          <a:p>
-            <a:r>
-              <a:rPr lang="en-US" dirty="0"/>
-              <a:t>Project Analysis</a:t>
-            </a:r>
-          </a:p>
-        </p:txBody>
-      </p:sp>
-      <p:sp>
-        <p:nvSpPr>
-          <p:cNvPr id="10" name="Text Placeholder 9">
-            <a:extLst>
-              <a:ext uri="{FF2B5EF4-FFF2-40B4-BE49-F238E27FC236}">
-                <a16:creationId xmlns:a16="http://schemas.microsoft.com/office/drawing/2014/main" id="{EF2BC084-E6DB-4DE7-B309-042A85EBA700}"/>
-              </a:ext>
-            </a:extLst>
-          </p:cNvPr>
-          <p:cNvSpPr>
-            <a:spLocks noGrp="1"/>
-          </p:cNvSpPr>
-          <p:nvPr>
-            <p:ph type="body" sz="quarter" idx="13"/>
-          </p:nvPr>
-        </p:nvSpPr>
-        <p:spPr/>
-        <p:txBody>
-          <a:bodyPr/>
-          <a:lstStyle/>
-          <a:p>
-            <a:r>
-              <a:rPr lang="en-US" dirty="0"/>
-              <a:t>Task 1:</a:t>
-            </a:r>
-          </a:p>
-          <a:p>
-            <a:r>
-              <a:rPr lang="en-US" dirty="0"/>
-              <a:t>Task 2:</a:t>
-            </a:r>
-          </a:p>
-          <a:p>
-            <a:r>
-              <a:rPr lang="en-US" dirty="0"/>
-              <a:t>Task 3:</a:t>
-            </a:r>
-          </a:p>
-        </p:txBody>
-      </p:sp>
-      <p:sp>
-        <p:nvSpPr>
-          <p:cNvPr id="2" name="Slide Number Placeholder 1">
-            <a:extLst>
-              <a:ext uri="{FF2B5EF4-FFF2-40B4-BE49-F238E27FC236}">
-                <a16:creationId xmlns:a16="http://schemas.microsoft.com/office/drawing/2014/main" id="{BE9800F6-D571-48C4-8466-12AA1ADB6599}"/>
-              </a:ext>
-            </a:extLst>
-          </p:cNvPr>
-          <p:cNvSpPr>
-            <a:spLocks noGrp="1"/>
-          </p:cNvSpPr>
-          <p:nvPr>
-            <p:ph type="sldNum" sz="quarter" idx="12"/>
-          </p:nvPr>
-        </p:nvSpPr>
-        <p:spPr/>
-        <p:txBody>
-          <a:bodyPr/>
-          <a:lstStyle/>
-          <a:p>
-            <a:fld id="{C263D6C4-4840-40CC-AC84-17E24B3B7BDE}" type="slidenum">
-              <a:rPr lang="en-US" smtClean="0"/>
-              <a:pPr/>
-              <a:t>6</a:t>
-            </a:fld>
-            <a:endParaRPr lang="en-US" dirty="0"/>
-          </a:p>
-        </p:txBody>
-      </p:sp>
-    </p:spTree>
-    <p:extLst>
-      <p:ext uri="{BB962C8B-B14F-4D97-AF65-F5344CB8AC3E}">
-        <p14:creationId xmlns:p14="http://schemas.microsoft.com/office/powerpoint/2010/main" val="3733486012"/>
       </p:ext>
     </p:extLst>
   </p:cSld>
@@ -29891,7 +31034,7 @@
           <a:p>
             <a:r>
               <a:rPr lang="en-US" dirty="0"/>
-              <a:t>Task 1</a:t>
+              <a:t>Task 2</a:t>
             </a:r>
           </a:p>
         </p:txBody>
@@ -29942,42 +31085,30 @@
             <p:ph type="body" sz="quarter" idx="1"/>
           </p:nvPr>
         </p:nvSpPr>
-        <p:spPr/>
+        <p:spPr>
+          <a:xfrm>
+            <a:off x="386526" y="1681163"/>
+            <a:ext cx="11418949" cy="823912"/>
+          </a:xfrm>
+        </p:spPr>
         <p:txBody>
-          <a:bodyPr/>
+          <a:bodyPr>
+            <a:normAutofit/>
+          </a:bodyPr>
           <a:lstStyle/>
           <a:p>
+            <a:pPr algn="just"/>
+            <a:r>
+              <a:rPr lang="en-US" i="1" dirty="0"/>
+              <a:t>Top-k</a:t>
+            </a:r>
             <a:r>
               <a:rPr lang="en-US" dirty="0"/>
-              <a:t>Lorem ipsum dolor sit amet</a:t>
+              <a:t> dominating query </a:t>
             </a:r>
-          </a:p>
-        </p:txBody>
-      </p:sp>
-      <p:sp>
-        <p:nvSpPr>
-          <p:cNvPr id="5" name="Text Placeholder 4">
-            <a:extLst>
-              <a:ext uri="{FF2B5EF4-FFF2-40B4-BE49-F238E27FC236}">
-                <a16:creationId xmlns:a16="http://schemas.microsoft.com/office/drawing/2014/main" id="{E0C87788-476B-4620-8002-A5C1177AD6C1}"/>
-              </a:ext>
-            </a:extLst>
-          </p:cNvPr>
-          <p:cNvSpPr>
-            <a:spLocks noGrp="1"/>
-          </p:cNvSpPr>
-          <p:nvPr>
-            <p:ph type="body" sz="quarter" idx="3"/>
-          </p:nvPr>
-        </p:nvSpPr>
-        <p:spPr/>
-        <p:txBody>
-          <a:bodyPr/>
-          <a:lstStyle/>
-          <a:p>
             <a:r>
-              <a:rPr lang="en-US" dirty="0"/>
-              <a:t>Lorem ipsum dolor sit amet</a:t>
+              <a:rPr lang="en-US" b="0" dirty="0"/>
+              <a:t>retrieve the k data objects that dominate the highest number of data objects in a dataset.</a:t>
             </a:r>
           </a:p>
         </p:txBody>
@@ -29998,7 +31129,12 @@
             <p:ph type="body" sz="quarter" idx="2"/>
           </p:nvPr>
         </p:nvSpPr>
-        <p:spPr/>
+        <p:spPr>
+          <a:xfrm>
+            <a:off x="6892801" y="2567781"/>
+            <a:ext cx="5157787" cy="3684588"/>
+          </a:xfrm>
+        </p:spPr>
         <p:txBody>
           <a:bodyPr/>
           <a:lstStyle/>
@@ -30022,47 +31158,70 @@
           </a:p>
         </p:txBody>
       </p:sp>
-      <p:sp>
-        <p:nvSpPr>
-          <p:cNvPr id="6" name="Text Placeholder 5">
+      <p:pic>
+        <p:nvPicPr>
+          <p:cNvPr id="15" name="Picture 14" descr="Chart, scatter chart&#10;&#10;Description automatically generated">
             <a:extLst>
               <a:ext uri="{FF2B5EF4-FFF2-40B4-BE49-F238E27FC236}">
-                <a16:creationId xmlns:a16="http://schemas.microsoft.com/office/drawing/2014/main" id="{000A9570-5EF6-4AFB-9FCA-7C8998E3FEB1}"/>
+                <a16:creationId xmlns:a16="http://schemas.microsoft.com/office/drawing/2014/main" id="{D9589739-B711-59A2-F023-EFC9A664C867}"/>
               </a:ext>
             </a:extLst>
           </p:cNvPr>
-          <p:cNvSpPr>
-            <a:spLocks noGrp="1"/>
-          </p:cNvSpPr>
-          <p:nvPr>
-            <p:ph type="body" sz="quarter" idx="4"/>
-          </p:nvPr>
-        </p:nvSpPr>
-        <p:spPr/>
-        <p:txBody>
-          <a:bodyPr/>
-          <a:lstStyle/>
-          <a:p>
-            <a:r>
-              <a:rPr lang="en-US" dirty="0"/>
-              <a:t>Lorem ipsum dolor sit amet, consectetuer adipiscing elit. Maecenas porttitor congue massa. Fusce posuere, magna sed pulvinar ultricies, purus lectus malesuada libero, sit amet commodo magna eros quis urna. Nunc viverra imperdiet enim. Fusce est. Vivamus a tellus.</a:t>
-            </a:r>
-          </a:p>
-          <a:p>
-            <a:r>
-              <a:rPr lang="en-US" dirty="0"/>
-              <a:t>Pellentesque habitant morbi tristique senectus et netus et malesuada fames ac turpis egestas. Proin pharetra nonummy pede. Mauris et orci.</a:t>
-            </a:r>
-          </a:p>
-          <a:p>
-            <a:endParaRPr lang="en-US" dirty="0"/>
-          </a:p>
-        </p:txBody>
-      </p:sp>
+          <p:cNvPicPr>
+            <a:picLocks noChangeAspect="1"/>
+          </p:cNvPicPr>
+          <p:nvPr/>
+        </p:nvPicPr>
+        <p:blipFill>
+          <a:blip r:embed="rId2"/>
+          <a:stretch>
+            <a:fillRect/>
+          </a:stretch>
+        </p:blipFill>
+        <p:spPr>
+          <a:xfrm>
+            <a:off x="465118" y="2446315"/>
+            <a:ext cx="3684588" cy="3684588"/>
+          </a:xfrm>
+          <a:prstGeom prst="rect">
+            <a:avLst/>
+          </a:prstGeom>
+        </p:spPr>
+      </p:pic>
+      <p:pic>
+        <p:nvPicPr>
+          <p:cNvPr id="5" name="Picture 4" descr="Chart, scatter chart&#10;&#10;Description automatically generated">
+            <a:extLst>
+              <a:ext uri="{FF2B5EF4-FFF2-40B4-BE49-F238E27FC236}">
+                <a16:creationId xmlns:a16="http://schemas.microsoft.com/office/drawing/2014/main" id="{B69555C9-7325-6F14-D9A5-37C0EA259D7A}"/>
+              </a:ext>
+            </a:extLst>
+          </p:cNvPr>
+          <p:cNvPicPr>
+            <a:picLocks noChangeAspect="1"/>
+          </p:cNvPicPr>
+          <p:nvPr/>
+        </p:nvPicPr>
+        <p:blipFill>
+          <a:blip r:embed="rId3"/>
+          <a:stretch>
+            <a:fillRect/>
+          </a:stretch>
+        </p:blipFill>
+        <p:spPr>
+          <a:xfrm>
+            <a:off x="462521" y="2446314"/>
+            <a:ext cx="3684588" cy="3684589"/>
+          </a:xfrm>
+          <a:prstGeom prst="rect">
+            <a:avLst/>
+          </a:prstGeom>
+        </p:spPr>
+      </p:pic>
     </p:spTree>
     <p:extLst>
       <p:ext uri="{BB962C8B-B14F-4D97-AF65-F5344CB8AC3E}">
-        <p14:creationId xmlns:p14="http://schemas.microsoft.com/office/powerpoint/2010/main" val="3607270498"/>
+        <p14:creationId xmlns:p14="http://schemas.microsoft.com/office/powerpoint/2010/main" val="1860213860"/>
       </p:ext>
     </p:extLst>
   </p:cSld>
@@ -30295,7 +31454,7 @@
     </p:spTree>
     <p:extLst>
       <p:ext uri="{BB962C8B-B14F-4D97-AF65-F5344CB8AC3E}">
-        <p14:creationId xmlns:p14="http://schemas.microsoft.com/office/powerpoint/2010/main" val="2229238531"/>
+        <p14:creationId xmlns:p14="http://schemas.microsoft.com/office/powerpoint/2010/main" val="458156879"/>
       </p:ext>
     </p:extLst>
   </p:cSld>
@@ -30336,38 +31495,10 @@
       </p:grpSpPr>
       <p:sp>
         <p:nvSpPr>
-          <p:cNvPr id="4" name="Title 3">
-            <a:extLst>
-              <a:ext uri="{FF2B5EF4-FFF2-40B4-BE49-F238E27FC236}">
-                <a16:creationId xmlns:a16="http://schemas.microsoft.com/office/drawing/2014/main" id="{315E3981-F0D7-482C-A8E0-6A57700BECA7}"/>
-              </a:ext>
-            </a:extLst>
-          </p:cNvPr>
-          <p:cNvSpPr>
-            <a:spLocks noGrp="1"/>
-          </p:cNvSpPr>
-          <p:nvPr>
-            <p:ph type="title"/>
-          </p:nvPr>
-        </p:nvSpPr>
-        <p:spPr/>
-        <p:txBody>
-          <a:bodyPr/>
-          <a:lstStyle/>
-          <a:p>
-            <a:r>
-              <a:rPr lang="en-US" dirty="0"/>
-              <a:t>Task 3</a:t>
-            </a:r>
-          </a:p>
-        </p:txBody>
-      </p:sp>
-      <p:sp>
-        <p:nvSpPr>
           <p:cNvPr id="2" name="Slide Number Placeholder 1">
             <a:extLst>
               <a:ext uri="{FF2B5EF4-FFF2-40B4-BE49-F238E27FC236}">
-                <a16:creationId xmlns:a16="http://schemas.microsoft.com/office/drawing/2014/main" id="{520FC4EE-F318-4344-9E3C-B950ADB63865}"/>
+                <a16:creationId xmlns:a16="http://schemas.microsoft.com/office/drawing/2014/main" id="{ED5D82C7-8910-CEE9-A138-FEAA3F66FEC7}"/>
               </a:ext>
             </a:extLst>
           </p:cNvPr>
@@ -30384,169 +31515,24 @@
           <a:lstStyle/>
           <a:p>
             <a:fld id="{C263D6C4-4840-40CC-AC84-17E24B3B7BDE}" type="slidenum">
-              <a:rPr lang="en-US" smtClean="0"/>
+              <a:rPr lang="en-US" noProof="0" smtClean="0"/>
               <a:pPr/>
               <a:t>9</a:t>
             </a:fld>
-            <a:endParaRPr lang="en-US" dirty="0"/>
-          </a:p>
-        </p:txBody>
-      </p:sp>
-      <p:sp>
-        <p:nvSpPr>
-          <p:cNvPr id="7" name="Text Placeholder 6">
-            <a:extLst>
-              <a:ext uri="{FF2B5EF4-FFF2-40B4-BE49-F238E27FC236}">
-                <a16:creationId xmlns:a16="http://schemas.microsoft.com/office/drawing/2014/main" id="{B74126B4-1E6C-4FFF-9282-40E18A85A07F}"/>
-              </a:ext>
-            </a:extLst>
-          </p:cNvPr>
-          <p:cNvSpPr>
-            <a:spLocks noGrp="1"/>
-          </p:cNvSpPr>
-          <p:nvPr>
-            <p:ph type="body" sz="quarter" idx="1"/>
-          </p:nvPr>
-        </p:nvSpPr>
-        <p:spPr/>
-        <p:txBody>
-          <a:bodyPr/>
-          <a:lstStyle/>
-          <a:p>
-            <a:r>
-              <a:rPr lang="en-US" dirty="0"/>
-              <a:t>Lorem ipsum dolor sit amet</a:t>
-            </a:r>
-          </a:p>
-        </p:txBody>
-      </p:sp>
-      <p:sp>
-        <p:nvSpPr>
-          <p:cNvPr id="5" name="Text Placeholder 4">
-            <a:extLst>
-              <a:ext uri="{FF2B5EF4-FFF2-40B4-BE49-F238E27FC236}">
-                <a16:creationId xmlns:a16="http://schemas.microsoft.com/office/drawing/2014/main" id="{E0C87788-476B-4620-8002-A5C1177AD6C1}"/>
-              </a:ext>
-            </a:extLst>
-          </p:cNvPr>
-          <p:cNvSpPr>
-            <a:spLocks noGrp="1"/>
-          </p:cNvSpPr>
-          <p:nvPr>
-            <p:ph type="body" sz="quarter" idx="3"/>
-          </p:nvPr>
-        </p:nvSpPr>
-        <p:spPr/>
-        <p:txBody>
-          <a:bodyPr/>
-          <a:lstStyle/>
-          <a:p>
-            <a:r>
-              <a:rPr lang="en-US" dirty="0"/>
-              <a:t>Lorem ipsum dolor sit amet</a:t>
-            </a:r>
-          </a:p>
-        </p:txBody>
-      </p:sp>
-      <p:sp>
-        <p:nvSpPr>
-          <p:cNvPr id="8" name="Text Placeholder 7">
-            <a:extLst>
-              <a:ext uri="{FF2B5EF4-FFF2-40B4-BE49-F238E27FC236}">
-                <a16:creationId xmlns:a16="http://schemas.microsoft.com/office/drawing/2014/main" id="{47DC4E62-1A34-4F98-A451-214F1808519C}"/>
-              </a:ext>
-            </a:extLst>
-          </p:cNvPr>
-          <p:cNvSpPr>
-            <a:spLocks noGrp="1"/>
-          </p:cNvSpPr>
-          <p:nvPr>
-            <p:ph type="body" sz="quarter" idx="2"/>
-          </p:nvPr>
-        </p:nvSpPr>
-        <p:spPr/>
-        <p:txBody>
-          <a:bodyPr/>
-          <a:lstStyle/>
-          <a:p>
-            <a:r>
-              <a:rPr lang="en-US" dirty="0"/>
-              <a:t>Lorem ipsum dolor sit amet, consectetuer adipiscing elit. Maecenas porttitor congue massa. Fusce posuere, magna sed pulvinar ultricies, purus lectus malesuada libero, sit amet commodo magna eros quis urna. Nunc viverra imperdiet enim. Fusce est. Vivamus a tellus.</a:t>
-            </a:r>
-          </a:p>
-          <a:p>
-            <a:r>
-              <a:rPr lang="en-US" dirty="0"/>
-              <a:t>Pellentesque habitant morbi tristique senectus et netus et malesuada fames ac turpis egestas. Proin pharetra nonummy pede. Mauris et orci.</a:t>
-            </a:r>
-          </a:p>
-          <a:p>
-            <a:endParaRPr lang="en-US" dirty="0"/>
-          </a:p>
-          <a:p>
-            <a:endParaRPr lang="en-US" dirty="0"/>
-          </a:p>
-        </p:txBody>
-      </p:sp>
-      <p:sp>
-        <p:nvSpPr>
-          <p:cNvPr id="6" name="Text Placeholder 5">
-            <a:extLst>
-              <a:ext uri="{FF2B5EF4-FFF2-40B4-BE49-F238E27FC236}">
-                <a16:creationId xmlns:a16="http://schemas.microsoft.com/office/drawing/2014/main" id="{000A9570-5EF6-4AFB-9FCA-7C8998E3FEB1}"/>
-              </a:ext>
-            </a:extLst>
-          </p:cNvPr>
-          <p:cNvSpPr>
-            <a:spLocks noGrp="1"/>
-          </p:cNvSpPr>
-          <p:nvPr>
-            <p:ph type="body" sz="quarter" idx="4"/>
-          </p:nvPr>
-        </p:nvSpPr>
-        <p:spPr/>
-        <p:txBody>
-          <a:bodyPr/>
-          <a:lstStyle/>
-          <a:p>
-            <a:r>
-              <a:rPr lang="en-US" dirty="0"/>
-              <a:t>Lorem ipsum dolor sit amet, consectetuer adipiscing elit. Maecenas porttitor congue massa. Fusce posuere, magna sed pulvinar ultricies, purus lectus malesuada libero, sit amet commodo magna eros quis urna. Nunc viverra imperdiet enim. Fusce est. Vivamus a tellus.</a:t>
-            </a:r>
-          </a:p>
-          <a:p>
-            <a:r>
-              <a:rPr lang="en-US" dirty="0"/>
-              <a:t>Pellentesque habitant morbi tristique senectus et netus et malesuada fames ac turpis egestas. Proin pharetra nonummy pede. Mauris et orci.</a:t>
-            </a:r>
-          </a:p>
-          <a:p>
-            <a:endParaRPr lang="en-US" dirty="0"/>
+            <a:endParaRPr lang="en-US" noProof="0" dirty="0"/>
           </a:p>
         </p:txBody>
       </p:sp>
     </p:spTree>
     <p:extLst>
       <p:ext uri="{BB962C8B-B14F-4D97-AF65-F5344CB8AC3E}">
-        <p14:creationId xmlns:p14="http://schemas.microsoft.com/office/powerpoint/2010/main" val="2687334512"/>
+        <p14:creationId xmlns:p14="http://schemas.microsoft.com/office/powerpoint/2010/main" val="1592003877"/>
       </p:ext>
     </p:extLst>
   </p:cSld>
   <p:clrMapOvr>
     <a:masterClrMapping/>
   </p:clrMapOvr>
-  <mc:AlternateContent xmlns:mc="http://schemas.openxmlformats.org/markup-compatibility/2006" xmlns:p14="http://schemas.microsoft.com/office/powerpoint/2010/main">
-    <mc:Choice Requires="p14">
-      <p:transition spd="med" p14:dur="700">
-        <p:fade/>
-      </p:transition>
-    </mc:Choice>
-    <mc:Fallback xmlns="">
-      <p:transition spd="med">
-        <p:fade/>
-      </p:transition>
-    </mc:Fallback>
-  </mc:AlternateContent>
 </p:sld>
 </file>
 
@@ -31342,23 +32328,6 @@
 </file>
 
 <file path=customXml/item1.xml><?xml version="1.0" encoding="utf-8"?>
-<p:properties xmlns:p="http://schemas.microsoft.com/office/2006/metadata/properties" xmlns:xsi="http://www.w3.org/2001/XMLSchema-instance" xmlns:pc="http://schemas.microsoft.com/office/infopath/2007/PartnerControls">
-  <documentManagement>
-    <MediaServiceKeyPoints xmlns="71af3243-3dd4-4a8d-8c0d-dd76da1f02a5" xsi:nil="true"/>
-  </documentManagement>
-</p:properties>
-</file>
-
-<file path=customXml/item2.xml><?xml version="1.0" encoding="utf-8"?>
-<?mso-contentType ?>
-<FormTemplates xmlns="http://schemas.microsoft.com/sharepoint/v3/contenttype/forms">
-  <Display>DocumentLibraryForm</Display>
-  <Edit>DocumentLibraryForm</Edit>
-  <New>DocumentLibraryForm</New>
-</FormTemplates>
-</file>
-
-<file path=customXml/item3.xml><?xml version="1.0" encoding="utf-8"?>
 <ct:contentTypeSchema xmlns:ct="http://schemas.microsoft.com/office/2006/metadata/contentType" xmlns:ma="http://schemas.microsoft.com/office/2006/metadata/properties/metaAttributes" ct:_="" ma:_="" ma:contentTypeName="Document" ma:contentTypeID="0x01010079F111ED35F8CC479449609E8A0923A6" ma:contentTypeVersion="11" ma:contentTypeDescription="Create a new document." ma:contentTypeScope="" ma:versionID="96291512c1ee715ab617f4c07df79fc1">
   <xsd:schema xmlns:xsd="http://www.w3.org/2001/XMLSchema" xmlns:xs="http://www.w3.org/2001/XMLSchema" xmlns:p="http://schemas.microsoft.com/office/2006/metadata/properties" xmlns:ns2="71af3243-3dd4-4a8d-8c0d-dd76da1f02a5" xmlns:ns3="16c05727-aa75-4e4a-9b5f-8a80a1165891" targetNamespace="http://schemas.microsoft.com/office/2006/metadata/properties" ma:root="true" ma:fieldsID="8256c27c40ca5c40ce1cf6c44f0205df" ns2:_="" ns3:_="">
     <xsd:import namespace="71af3243-3dd4-4a8d-8c0d-dd76da1f02a5"/>
@@ -31569,25 +32538,24 @@
 </ct:contentTypeSchema>
 </file>
 
-<file path=customXml/itemProps1.xml><?xml version="1.0" encoding="utf-8"?>
-<ds:datastoreItem xmlns:ds="http://schemas.openxmlformats.org/officeDocument/2006/customXml" ds:itemID="{F5757914-1161-4661-9696-421FD6935CDD}">
-  <ds:schemaRefs>
-    <ds:schemaRef ds:uri="http://schemas.microsoft.com/office/2006/metadata/properties"/>
-    <ds:schemaRef ds:uri="http://schemas.microsoft.com/office/infopath/2007/PartnerControls"/>
-    <ds:schemaRef ds:uri="71af3243-3dd4-4a8d-8c0d-dd76da1f02a5"/>
-  </ds:schemaRefs>
-</ds:datastoreItem>
+<file path=customXml/item2.xml><?xml version="1.0" encoding="utf-8"?>
+<?mso-contentType ?>
+<FormTemplates xmlns="http://schemas.microsoft.com/sharepoint/v3/contenttype/forms">
+  <Display>DocumentLibraryForm</Display>
+  <Edit>DocumentLibraryForm</Edit>
+  <New>DocumentLibraryForm</New>
+</FormTemplates>
 </file>
 
-<file path=customXml/itemProps2.xml><?xml version="1.0" encoding="utf-8"?>
-<ds:datastoreItem xmlns:ds="http://schemas.openxmlformats.org/officeDocument/2006/customXml" ds:itemID="{5B26E0C9-B2AA-42E6-97B6-E1B7D9EAF129}">
-  <ds:schemaRefs>
-    <ds:schemaRef ds:uri="http://schemas.microsoft.com/sharepoint/v3/contenttype/forms"/>
-  </ds:schemaRefs>
-</ds:datastoreItem>
+<file path=customXml/item3.xml><?xml version="1.0" encoding="utf-8"?>
+<p:properties xmlns:p="http://schemas.microsoft.com/office/2006/metadata/properties" xmlns:xsi="http://www.w3.org/2001/XMLSchema-instance" xmlns:pc="http://schemas.microsoft.com/office/infopath/2007/PartnerControls">
+  <documentManagement>
+    <MediaServiceKeyPoints xmlns="71af3243-3dd4-4a8d-8c0d-dd76da1f02a5" xsi:nil="true"/>
+  </documentManagement>
+</p:properties>
 </file>
 
-<file path=customXml/itemProps3.xml><?xml version="1.0" encoding="utf-8"?>
+<file path=customXml/itemProps1.xml><?xml version="1.0" encoding="utf-8"?>
 <ds:datastoreItem xmlns:ds="http://schemas.openxmlformats.org/officeDocument/2006/customXml" ds:itemID="{4C103400-4A22-4E35-B588-4C4D42638959}">
   <ds:schemaRefs>
     <ds:schemaRef ds:uri="http://schemas.microsoft.com/office/2006/metadata/contentType"/>
@@ -31604,4 +32572,29 @@
     <ds:schemaRef ds:uri="http://schemas.microsoft.com/internal/obd"/>
   </ds:schemaRefs>
 </ds:datastoreItem>
+</file>
+
+<file path=customXml/itemProps2.xml><?xml version="1.0" encoding="utf-8"?>
+<ds:datastoreItem xmlns:ds="http://schemas.openxmlformats.org/officeDocument/2006/customXml" ds:itemID="{5B26E0C9-B2AA-42E6-97B6-E1B7D9EAF129}">
+  <ds:schemaRefs>
+    <ds:schemaRef ds:uri="http://schemas.microsoft.com/sharepoint/v3/contenttype/forms"/>
+  </ds:schemaRefs>
+</ds:datastoreItem>
+</file>
+
+<file path=customXml/itemProps3.xml><?xml version="1.0" encoding="utf-8"?>
+<ds:datastoreItem xmlns:ds="http://schemas.openxmlformats.org/officeDocument/2006/customXml" ds:itemID="{F5757914-1161-4661-9696-421FD6935CDD}">
+  <ds:schemaRefs>
+    <ds:schemaRef ds:uri="http://schemas.microsoft.com/office/2006/documentManagement/types"/>
+    <ds:schemaRef ds:uri="http://schemas.microsoft.com/office/infopath/2007/PartnerControls"/>
+    <ds:schemaRef ds:uri="http://purl.org/dc/terms/"/>
+    <ds:schemaRef ds:uri="http://purl.org/dc/dcmitype/"/>
+    <ds:schemaRef ds:uri="16c05727-aa75-4e4a-9b5f-8a80a1165891"/>
+    <ds:schemaRef ds:uri="http://www.w3.org/XML/1998/namespace"/>
+    <ds:schemaRef ds:uri="71af3243-3dd4-4a8d-8c0d-dd76da1f02a5"/>
+    <ds:schemaRef ds:uri="http://schemas.openxmlformats.org/package/2006/metadata/core-properties"/>
+    <ds:schemaRef ds:uri="http://schemas.microsoft.com/office/2006/metadata/properties"/>
+    <ds:schemaRef ds:uri="http://purl.org/dc/elements/1.1/"/>
+  </ds:schemaRefs>
+</ds:datastoreItem>
 </file>
</xml_diff>